<commit_message>
DCS and L1 calo content
</commit_message>
<xml_diff>
--- a/Chicago Reports/08-15-2022_Jacky&Peter.pptx
+++ b/Chicago Reports/08-15-2022_Jacky&Peter.pptx
@@ -5,7 +5,7 @@
     <p:sldMasterId id="2147483898" r:id="rId1"/>
   </p:sldMasterIdLst>
   <p:notesMasterIdLst>
-    <p:notesMasterId r:id="rId15"/>
+    <p:notesMasterId r:id="rId17"/>
   </p:notesMasterIdLst>
   <p:sldIdLst>
     <p:sldId id="257" r:id="rId2"/>
@@ -13,14 +13,16 @@
     <p:sldId id="270" r:id="rId4"/>
     <p:sldId id="271" r:id="rId5"/>
     <p:sldId id="272" r:id="rId6"/>
-    <p:sldId id="273" r:id="rId7"/>
-    <p:sldId id="274" r:id="rId8"/>
-    <p:sldId id="275" r:id="rId9"/>
-    <p:sldId id="276" r:id="rId10"/>
-    <p:sldId id="277" r:id="rId11"/>
-    <p:sldId id="278" r:id="rId12"/>
-    <p:sldId id="279" r:id="rId13"/>
-    <p:sldId id="280" r:id="rId14"/>
+    <p:sldId id="281" r:id="rId7"/>
+    <p:sldId id="282" r:id="rId8"/>
+    <p:sldId id="273" r:id="rId9"/>
+    <p:sldId id="274" r:id="rId10"/>
+    <p:sldId id="275" r:id="rId11"/>
+    <p:sldId id="276" r:id="rId12"/>
+    <p:sldId id="277" r:id="rId13"/>
+    <p:sldId id="278" r:id="rId14"/>
+    <p:sldId id="279" r:id="rId15"/>
+    <p:sldId id="280" r:id="rId16"/>
   </p:sldIdLst>
   <p:sldSz cx="12192000" cy="6858000"/>
   <p:notesSz cx="6858000" cy="9144000"/>
@@ -129,6 +131,8 @@
             <p14:sldId id="270"/>
             <p14:sldId id="271"/>
             <p14:sldId id="272"/>
+            <p14:sldId id="281"/>
+            <p14:sldId id="282"/>
             <p14:sldId id="273"/>
             <p14:sldId id="274"/>
             <p14:sldId id="275"/>
@@ -671,7 +675,7 @@
           <a:p>
             <a:fld id="{C5393B8A-4D23-47E9-8862-6191A7563E10}" type="slidenum">
               <a:rPr lang="zh-CN" altLang="en-US" smtClean="0"/>
-              <a:t>10</a:t>
+              <a:t>12</a:t>
             </a:fld>
             <a:endParaRPr lang="zh-CN" altLang="en-US"/>
           </a:p>
@@ -755,7 +759,7 @@
           <a:p>
             <a:fld id="{C5393B8A-4D23-47E9-8862-6191A7563E10}" type="slidenum">
               <a:rPr lang="zh-CN" altLang="en-US" smtClean="0"/>
-              <a:t>11</a:t>
+              <a:t>13</a:t>
             </a:fld>
             <a:endParaRPr lang="zh-CN" altLang="en-US"/>
           </a:p>
@@ -4434,28 +4438,38 @@
                 <a:latin typeface="Bahnschrift" panose="020B0502040204020203" pitchFamily="34" charset="0"/>
                 <a:cs typeface="Times New Roman" panose="02020603050405020304" pitchFamily="18" charset="0"/>
               </a:rPr>
-              <a:t>Old CIS techs leaving</a:t>
-            </a:r>
-          </a:p>
-          <a:p>
-            <a:pPr lvl="1"/>
-            <a:r>
-              <a:rPr lang="en-US" altLang="zh-CN" sz="1600" dirty="0">
+              <a:t>Meeting with Irakli Minashvili</a:t>
+            </a:r>
+          </a:p>
+          <a:p>
+            <a:endParaRPr lang="en-US" altLang="zh-CN" sz="2000" dirty="0">
+              <a:latin typeface="Bahnschrift" panose="020B0502040204020203" pitchFamily="34" charset="0"/>
+              <a:cs typeface="Times New Roman" panose="02020603050405020304" pitchFamily="18" charset="0"/>
+            </a:endParaRPr>
+          </a:p>
+          <a:p>
+            <a:r>
+              <a:rPr lang="en-US" altLang="zh-CN" sz="2000" dirty="0">
                 <a:latin typeface="Bahnschrift" panose="020B0502040204020203" pitchFamily="34" charset="0"/>
                 <a:cs typeface="Times New Roman" panose="02020603050405020304" pitchFamily="18" charset="0"/>
               </a:rPr>
-              <a:t>Katie left on July 25</a:t>
-            </a:r>
-          </a:p>
-          <a:p>
-            <a:pPr lvl="1"/>
-            <a:r>
-              <a:rPr lang="en-US" altLang="zh-CN" sz="1600" dirty="0">
+              <a:t>Done:</a:t>
+            </a:r>
+          </a:p>
+          <a:p>
+            <a:r>
+              <a:rPr lang="en-US" altLang="zh-CN" sz="2000" dirty="0">
                 <a:latin typeface="Bahnschrift" panose="020B0502040204020203" pitchFamily="34" charset="0"/>
                 <a:cs typeface="Times New Roman" panose="02020603050405020304" pitchFamily="18" charset="0"/>
               </a:rPr>
-              <a:t>Dawit left on August 13</a:t>
-            </a:r>
+              <a:t>Checked the legacy Tile system in Test Beam.</a:t>
+            </a:r>
+          </a:p>
+          <a:p>
+            <a:endParaRPr lang="en-US" altLang="zh-CN" sz="2000" dirty="0">
+              <a:latin typeface="Bahnschrift" panose="020B0502040204020203" pitchFamily="34" charset="0"/>
+              <a:cs typeface="Times New Roman" panose="02020603050405020304" pitchFamily="18" charset="0"/>
+            </a:endParaRPr>
           </a:p>
           <a:p>
             <a:r>
@@ -4463,7 +4477,7 @@
                 <a:latin typeface="Bahnschrift" panose="020B0502040204020203" pitchFamily="34" charset="0"/>
                 <a:cs typeface="Times New Roman" panose="02020603050405020304" pitchFamily="18" charset="0"/>
               </a:rPr>
-              <a:t>Prof. David Miller’s visit late June</a:t>
+              <a:t>To do:</a:t>
             </a:r>
           </a:p>
           <a:p>
@@ -4472,7 +4486,7 @@
                 <a:latin typeface="Bahnschrift" panose="020B0502040204020203" pitchFamily="34" charset="0"/>
                 <a:cs typeface="Times New Roman" panose="02020603050405020304" pitchFamily="18" charset="0"/>
               </a:rPr>
-              <a:t>Getting settled in the city</a:t>
+              <a:t>Shift training. </a:t>
             </a:r>
           </a:p>
           <a:p>
@@ -4481,7 +4495,7 @@
                 <a:latin typeface="Bahnschrift" panose="020B0502040204020203" pitchFamily="34" charset="0"/>
                 <a:cs typeface="Times New Roman" panose="02020603050405020304" pitchFamily="18" charset="0"/>
               </a:rPr>
-              <a:t>Learning/refreshing driving manual</a:t>
+              <a:t>None, until further notice. (Irakli is taking his vacation)</a:t>
             </a:r>
           </a:p>
           <a:p>
@@ -4528,134 +4542,35 @@
           <a:lstStyle/>
           <a:p>
             <a:pPr algn="ctr"/>
-            <a:endParaRPr lang="en-US"/>
+            <a:endParaRPr lang="en-US" dirty="0"/>
           </a:p>
           <a:p>
             <a:pPr algn="ctr"/>
-            <a:endParaRPr lang="en-US"/>
+            <a:endParaRPr lang="en-US" dirty="0"/>
           </a:p>
           <a:p>
             <a:pPr algn="ctr"/>
             <a:r>
-              <a:rPr lang="en-US" sz="4800" b="1">
+              <a:rPr lang="en-US" sz="4800" b="1" dirty="0">
                 <a:solidFill>
                   <a:schemeClr val="bg1"/>
                 </a:solidFill>
                 <a:latin typeface="Bahnschrift" panose="020B0502040204020203" pitchFamily="34" charset="0"/>
               </a:rPr>
-              <a:t>7. Life</a:t>
-            </a:r>
-            <a:endParaRPr lang="en-US"/>
+              <a:t>5. Test Beam</a:t>
+            </a:r>
+            <a:endParaRPr lang="en-US" dirty="0"/>
           </a:p>
           <a:p>
             <a:pPr algn="ctr"/>
             <a:endParaRPr lang="en-US" dirty="0"/>
-          </a:p>
-        </p:txBody>
-      </p:sp>
-      <p:pic>
-        <p:nvPicPr>
-          <p:cNvPr id="4" name="内容占位符 3">
-            <a:extLst>
-              <a:ext uri="{FF2B5EF4-FFF2-40B4-BE49-F238E27FC236}">
-                <a16:creationId xmlns:a16="http://schemas.microsoft.com/office/drawing/2014/main" id="{7B5218E0-5DE0-60D3-F782-41EE5A13FBFC}"/>
-              </a:ext>
-            </a:extLst>
-          </p:cNvPr>
-          <p:cNvPicPr>
-            <a:picLocks noChangeAspect="1"/>
-          </p:cNvPicPr>
-          <p:nvPr/>
-        </p:nvPicPr>
-        <p:blipFill>
-          <a:blip r:embed="rId3" cstate="print">
-            <a:extLst>
-              <a:ext uri="{28A0092B-C50C-407E-A947-70E740481C1C}">
-                <a14:useLocalDpi xmlns:a14="http://schemas.microsoft.com/office/drawing/2010/main" val="0"/>
-              </a:ext>
-            </a:extLst>
-          </a:blip>
-          <a:stretch>
-            <a:fillRect/>
-          </a:stretch>
-        </p:blipFill>
-        <p:spPr>
-          <a:xfrm>
-            <a:off x="7441790" y="2346311"/>
-            <a:ext cx="4374473" cy="3280855"/>
-          </a:xfrm>
-          <a:prstGeom prst="rect">
-            <a:avLst/>
-          </a:prstGeom>
-        </p:spPr>
-      </p:pic>
-      <p:sp>
-        <p:nvSpPr>
-          <p:cNvPr id="10" name="矩形 4">
-            <a:extLst>
-              <a:ext uri="{FF2B5EF4-FFF2-40B4-BE49-F238E27FC236}">
-                <a16:creationId xmlns:a16="http://schemas.microsoft.com/office/drawing/2014/main" id="{10A9A6E1-059D-870B-F7FB-CE495D7E200E}"/>
-              </a:ext>
-            </a:extLst>
-          </p:cNvPr>
-          <p:cNvSpPr/>
-          <p:nvPr/>
-        </p:nvSpPr>
-        <p:spPr>
-          <a:xfrm>
-            <a:off x="8105211" y="5619689"/>
-            <a:ext cx="3047629" cy="400110"/>
-          </a:xfrm>
-          <a:prstGeom prst="rect">
-            <a:avLst/>
-          </a:prstGeom>
-        </p:spPr>
-        <p:txBody>
-          <a:bodyPr wrap="none">
-            <a:spAutoFit/>
-          </a:bodyPr>
-          <a:lstStyle/>
-          <a:p>
-            <a:r>
-              <a:rPr lang="en-US" altLang="zh-CN" dirty="0">
-                <a:latin typeface="Bahnschrift" panose="020B0502040204020203" pitchFamily="34" charset="0"/>
-              </a:rPr>
-              <a:t>June 29</a:t>
-            </a:r>
-            <a:r>
-              <a:rPr lang="en-US" altLang="zh-CN" baseline="30000" dirty="0">
-                <a:latin typeface="Bahnschrift" panose="020B0502040204020203" pitchFamily="34" charset="0"/>
-              </a:rPr>
-              <a:t>th</a:t>
-            </a:r>
-            <a:r>
-              <a:rPr lang="en-US" altLang="zh-CN" dirty="0">
-                <a:latin typeface="Bahnschrift" panose="020B0502040204020203" pitchFamily="34" charset="0"/>
-              </a:rPr>
-              <a:t> , </a:t>
-            </a:r>
-            <a:r>
-              <a:rPr lang="en-US" altLang="zh-CN" sz="2000" dirty="0">
-                <a:latin typeface="Bahnschrift" panose="020B0502040204020203" pitchFamily="34" charset="0"/>
-              </a:rPr>
-              <a:t>Dinner</a:t>
-            </a:r>
-            <a:r>
-              <a:rPr lang="en-US" altLang="zh-CN" dirty="0">
-                <a:latin typeface="Bahnschrift" panose="020B0502040204020203" pitchFamily="34" charset="0"/>
-              </a:rPr>
-              <a:t> at Luigi’s</a:t>
-            </a:r>
-            <a:endParaRPr lang="en-US" altLang="zh-CN" baseline="30000" dirty="0">
-              <a:latin typeface="Bahnschrift" panose="020B0502040204020203" pitchFamily="34" charset="0"/>
-            </a:endParaRPr>
           </a:p>
         </p:txBody>
       </p:sp>
     </p:spTree>
     <p:extLst>
       <p:ext uri="{BB962C8B-B14F-4D97-AF65-F5344CB8AC3E}">
-        <p14:creationId xmlns:p14="http://schemas.microsoft.com/office/powerpoint/2010/main" val="666364713"/>
+        <p14:creationId xmlns:p14="http://schemas.microsoft.com/office/powerpoint/2010/main" val="2905575947"/>
       </p:ext>
     </p:extLst>
   </p:cSld>
@@ -4694,8 +4609,8 @@
         </p:nvSpPr>
         <p:spPr>
           <a:xfrm>
-            <a:off x="1177333" y="3292963"/>
-            <a:ext cx="3170931" cy="695377"/>
+            <a:off x="1683171" y="2757942"/>
+            <a:ext cx="8825659" cy="3261857"/>
           </a:xfrm>
         </p:spPr>
         <p:txBody>
@@ -4704,16 +4619,72 @@
           </a:bodyPr>
           <a:lstStyle/>
           <a:p>
-            <a:pPr marL="0" indent="0">
-              <a:buNone/>
-            </a:pPr>
             <a:r>
               <a:rPr lang="en-US" altLang="zh-CN" sz="2000" dirty="0">
                 <a:latin typeface="Bahnschrift" panose="020B0502040204020203" pitchFamily="34" charset="0"/>
                 <a:cs typeface="Times New Roman" panose="02020603050405020304" pitchFamily="18" charset="0"/>
               </a:rPr>
-              <a:t>Jacky teaching Peter to drive manual</a:t>
-            </a:r>
+              <a:t>Peter’s first shifts were August 2 – August 8</a:t>
+            </a:r>
+          </a:p>
+          <a:p>
+            <a:pPr lvl="1"/>
+            <a:r>
+              <a:rPr lang="en-US" altLang="zh-CN" sz="1600" dirty="0">
+                <a:latin typeface="Bahnschrift" panose="020B0502040204020203" pitchFamily="34" charset="0"/>
+                <a:cs typeface="Times New Roman" panose="02020603050405020304" pitchFamily="18" charset="0"/>
+              </a:rPr>
+              <a:t>Monitoring data quality for Tile modules</a:t>
+            </a:r>
+          </a:p>
+          <a:p>
+            <a:pPr lvl="1"/>
+            <a:r>
+              <a:rPr lang="en-US" altLang="zh-CN" sz="1600" dirty="0">
+                <a:latin typeface="Bahnschrift" panose="020B0502040204020203" pitchFamily="34" charset="0"/>
+                <a:cs typeface="Times New Roman" panose="02020603050405020304" pitchFamily="18" charset="0"/>
+              </a:rPr>
+              <a:t>Reporting on </a:t>
+            </a:r>
+            <a:r>
+              <a:rPr lang="en-US" altLang="zh-CN" sz="1600" dirty="0" err="1">
+                <a:latin typeface="Bahnschrift" panose="020B0502040204020203" pitchFamily="34" charset="0"/>
+                <a:cs typeface="Times New Roman" panose="02020603050405020304" pitchFamily="18" charset="0"/>
+              </a:rPr>
+              <a:t>LAr</a:t>
+            </a:r>
+            <a:r>
+              <a:rPr lang="en-US" altLang="zh-CN" sz="1600" dirty="0">
+                <a:latin typeface="Bahnschrift" panose="020B0502040204020203" pitchFamily="34" charset="0"/>
+                <a:cs typeface="Times New Roman" panose="02020603050405020304" pitchFamily="18" charset="0"/>
+              </a:rPr>
+              <a:t> status and major problems </a:t>
+            </a:r>
+          </a:p>
+          <a:p>
+            <a:pPr lvl="1"/>
+            <a:r>
+              <a:rPr lang="en-US" altLang="zh-CN" sz="1600" dirty="0">
+                <a:latin typeface="Bahnschrift" panose="020B0502040204020203" pitchFamily="34" charset="0"/>
+                <a:cs typeface="Times New Roman" panose="02020603050405020304" pitchFamily="18" charset="0"/>
+              </a:rPr>
+              <a:t>More shifts in late August and September</a:t>
+            </a:r>
+          </a:p>
+          <a:p>
+            <a:r>
+              <a:rPr lang="en-US" altLang="zh-CN" sz="2000" dirty="0">
+                <a:latin typeface="Bahnschrift" panose="020B0502040204020203" pitchFamily="34" charset="0"/>
+                <a:cs typeface="Times New Roman" panose="02020603050405020304" pitchFamily="18" charset="0"/>
+              </a:rPr>
+              <a:t>Jacky’s shift training is in late August, will take shifts next semester</a:t>
+            </a:r>
+          </a:p>
+          <a:p>
+            <a:endParaRPr lang="en-US" altLang="zh-CN" sz="2000" dirty="0">
+              <a:latin typeface="Bahnschrift" panose="020B0502040204020203" pitchFamily="34" charset="0"/>
+              <a:cs typeface="Times New Roman" panose="02020603050405020304" pitchFamily="18" charset="0"/>
+            </a:endParaRPr>
           </a:p>
         </p:txBody>
       </p:sp>
@@ -4768,119 +4739,20 @@
                 </a:solidFill>
                 <a:latin typeface="Bahnschrift" panose="020B0502040204020203" pitchFamily="34" charset="0"/>
               </a:rPr>
-              <a:t>7. Life (More Pictures)</a:t>
+              <a:t>6. ATLAS Control Room Shifts</a:t>
             </a:r>
             <a:endParaRPr lang="en-US" dirty="0"/>
           </a:p>
           <a:p>
             <a:pPr algn="ctr"/>
             <a:endParaRPr lang="en-US" dirty="0"/>
-          </a:p>
-        </p:txBody>
-      </p:sp>
-      <p:pic>
-        <p:nvPicPr>
-          <p:cNvPr id="4" name="内容占位符 3">
-            <a:extLst>
-              <a:ext uri="{FF2B5EF4-FFF2-40B4-BE49-F238E27FC236}">
-                <a16:creationId xmlns:a16="http://schemas.microsoft.com/office/drawing/2014/main" id="{7B5218E0-5DE0-60D3-F782-41EE5A13FBFC}"/>
-              </a:ext>
-            </a:extLst>
-          </p:cNvPr>
-          <p:cNvPicPr>
-            <a:picLocks noChangeAspect="1"/>
-          </p:cNvPicPr>
-          <p:nvPr/>
-        </p:nvPicPr>
-        <p:blipFill>
-          <a:blip r:embed="rId3" cstate="print">
-            <a:extLst>
-              <a:ext uri="{28A0092B-C50C-407E-A947-70E740481C1C}">
-                <a14:useLocalDpi xmlns:a14="http://schemas.microsoft.com/office/drawing/2010/main" val="0"/>
-              </a:ext>
-            </a:extLst>
-          </a:blip>
-          <a:stretch>
-            <a:fillRect/>
-          </a:stretch>
-        </p:blipFill>
-        <p:spPr>
-          <a:xfrm>
-            <a:off x="7441790" y="2346311"/>
-            <a:ext cx="4374473" cy="3280855"/>
-          </a:xfrm>
-          <a:prstGeom prst="rect">
-            <a:avLst/>
-          </a:prstGeom>
-        </p:spPr>
-      </p:pic>
-      <p:sp>
-        <p:nvSpPr>
-          <p:cNvPr id="10" name="矩形 4">
-            <a:extLst>
-              <a:ext uri="{FF2B5EF4-FFF2-40B4-BE49-F238E27FC236}">
-                <a16:creationId xmlns:a16="http://schemas.microsoft.com/office/drawing/2014/main" id="{10A9A6E1-059D-870B-F7FB-CE495D7E200E}"/>
-              </a:ext>
-            </a:extLst>
-          </p:cNvPr>
-          <p:cNvSpPr/>
-          <p:nvPr/>
-        </p:nvSpPr>
-        <p:spPr>
-          <a:xfrm>
-            <a:off x="8105211" y="5619689"/>
-            <a:ext cx="3047629" cy="400110"/>
-          </a:xfrm>
-          <a:prstGeom prst="rect">
-            <a:avLst/>
-          </a:prstGeom>
-        </p:spPr>
-        <p:txBody>
-          <a:bodyPr wrap="none">
-            <a:spAutoFit/>
-          </a:bodyPr>
-          <a:lstStyle/>
-          <a:p>
-            <a:r>
-              <a:rPr lang="en-US" altLang="zh-CN" dirty="0">
-                <a:latin typeface="Bahnschrift" panose="020B0502040204020203" pitchFamily="34" charset="0"/>
-              </a:rPr>
-              <a:t>June 29</a:t>
-            </a:r>
-            <a:r>
-              <a:rPr lang="en-US" altLang="zh-CN" baseline="30000" dirty="0">
-                <a:latin typeface="Bahnschrift" panose="020B0502040204020203" pitchFamily="34" charset="0"/>
-              </a:rPr>
-              <a:t>th</a:t>
-            </a:r>
-            <a:r>
-              <a:rPr lang="en-US" altLang="zh-CN" dirty="0">
-                <a:latin typeface="Bahnschrift" panose="020B0502040204020203" pitchFamily="34" charset="0"/>
-              </a:rPr>
-              <a:t> , </a:t>
-            </a:r>
-            <a:r>
-              <a:rPr lang="en-US" altLang="zh-CN" sz="2000" dirty="0">
-                <a:latin typeface="Bahnschrift" panose="020B0502040204020203" pitchFamily="34" charset="0"/>
-              </a:rPr>
-              <a:t>Dinner</a:t>
-            </a:r>
-            <a:r>
-              <a:rPr lang="en-US" altLang="zh-CN" dirty="0">
-                <a:latin typeface="Bahnschrift" panose="020B0502040204020203" pitchFamily="34" charset="0"/>
-              </a:rPr>
-              <a:t> at Luigi’s</a:t>
-            </a:r>
-            <a:endParaRPr lang="en-US" altLang="zh-CN" baseline="30000" dirty="0">
-              <a:latin typeface="Bahnschrift" panose="020B0502040204020203" pitchFamily="34" charset="0"/>
-            </a:endParaRPr>
           </a:p>
         </p:txBody>
       </p:sp>
     </p:spTree>
     <p:extLst>
       <p:ext uri="{BB962C8B-B14F-4D97-AF65-F5344CB8AC3E}">
-        <p14:creationId xmlns:p14="http://schemas.microsoft.com/office/powerpoint/2010/main" val="1810179627"/>
+        <p14:creationId xmlns:p14="http://schemas.microsoft.com/office/powerpoint/2010/main" val="2788648890"/>
       </p:ext>
     </p:extLst>
   </p:cSld>
@@ -4934,7 +4806,7 @@
                 <a:latin typeface="Bahnschrift" panose="020B0502040204020203" pitchFamily="34" charset="0"/>
                 <a:cs typeface="Times New Roman" panose="02020603050405020304" pitchFamily="18" charset="0"/>
               </a:rPr>
-              <a:t>Peter’s first shifts were August 2 – August 8</a:t>
+              <a:t>Old CIS techs leaving</a:t>
             </a:r>
           </a:p>
           <a:p>
@@ -4944,7 +4816,7 @@
                 <a:latin typeface="Bahnschrift" panose="020B0502040204020203" pitchFamily="34" charset="0"/>
                 <a:cs typeface="Times New Roman" panose="02020603050405020304" pitchFamily="18" charset="0"/>
               </a:rPr>
-              <a:t>Monitoring data quality for Tile modules</a:t>
+              <a:t>Katie left on July 25</a:t>
             </a:r>
           </a:p>
           <a:p>
@@ -4954,40 +4826,34 @@
                 <a:latin typeface="Bahnschrift" panose="020B0502040204020203" pitchFamily="34" charset="0"/>
                 <a:cs typeface="Times New Roman" panose="02020603050405020304" pitchFamily="18" charset="0"/>
               </a:rPr>
-              <a:t>Reporting on </a:t>
-            </a:r>
-            <a:r>
-              <a:rPr lang="en-US" altLang="zh-CN" sz="1600" dirty="0" err="1">
+              <a:t>Dawit left on August 13</a:t>
+            </a:r>
+          </a:p>
+          <a:p>
+            <a:r>
+              <a:rPr lang="en-US" altLang="zh-CN" sz="2000" dirty="0">
                 <a:latin typeface="Bahnschrift" panose="020B0502040204020203" pitchFamily="34" charset="0"/>
                 <a:cs typeface="Times New Roman" panose="02020603050405020304" pitchFamily="18" charset="0"/>
               </a:rPr>
-              <a:t>LAr</a:t>
-            </a:r>
-            <a:r>
-              <a:rPr lang="en-US" altLang="zh-CN" sz="1600" dirty="0">
+              <a:t>Prof. David Miller’s visit late June</a:t>
+            </a:r>
+          </a:p>
+          <a:p>
+            <a:r>
+              <a:rPr lang="en-US" altLang="zh-CN" sz="2000" dirty="0">
                 <a:latin typeface="Bahnschrift" panose="020B0502040204020203" pitchFamily="34" charset="0"/>
                 <a:cs typeface="Times New Roman" panose="02020603050405020304" pitchFamily="18" charset="0"/>
               </a:rPr>
-              <a:t> status and major problems </a:t>
-            </a:r>
-          </a:p>
-          <a:p>
-            <a:pPr lvl="1"/>
-            <a:r>
-              <a:rPr lang="en-US" altLang="zh-CN" sz="1600" dirty="0">
+              <a:t>Getting settled in the city</a:t>
+            </a:r>
+          </a:p>
+          <a:p>
+            <a:r>
+              <a:rPr lang="en-US" altLang="zh-CN" sz="2000" dirty="0">
                 <a:latin typeface="Bahnschrift" panose="020B0502040204020203" pitchFamily="34" charset="0"/>
                 <a:cs typeface="Times New Roman" panose="02020603050405020304" pitchFamily="18" charset="0"/>
               </a:rPr>
-              <a:t>More shifts in late August and September</a:t>
-            </a:r>
-          </a:p>
-          <a:p>
-            <a:r>
-              <a:rPr lang="en-US" altLang="zh-CN" sz="2000" dirty="0">
-                <a:latin typeface="Bahnschrift" panose="020B0502040204020203" pitchFamily="34" charset="0"/>
-                <a:cs typeface="Times New Roman" panose="02020603050405020304" pitchFamily="18" charset="0"/>
-              </a:rPr>
-              <a:t>Jacky’s shift training is in late August, will take shifts next semester</a:t>
+              <a:t>Learning/refreshing driving manual</a:t>
             </a:r>
           </a:p>
           <a:p>
@@ -5034,6 +4900,413 @@
           <a:lstStyle/>
           <a:p>
             <a:pPr algn="ctr"/>
+            <a:endParaRPr lang="en-US"/>
+          </a:p>
+          <a:p>
+            <a:pPr algn="ctr"/>
+            <a:endParaRPr lang="en-US"/>
+          </a:p>
+          <a:p>
+            <a:pPr algn="ctr"/>
+            <a:r>
+              <a:rPr lang="en-US" sz="4800" b="1">
+                <a:solidFill>
+                  <a:schemeClr val="bg1"/>
+                </a:solidFill>
+                <a:latin typeface="Bahnschrift" panose="020B0502040204020203" pitchFamily="34" charset="0"/>
+              </a:rPr>
+              <a:t>7. Life</a:t>
+            </a:r>
+            <a:endParaRPr lang="en-US"/>
+          </a:p>
+          <a:p>
+            <a:pPr algn="ctr"/>
+            <a:endParaRPr lang="en-US" dirty="0"/>
+          </a:p>
+        </p:txBody>
+      </p:sp>
+      <p:pic>
+        <p:nvPicPr>
+          <p:cNvPr id="4" name="内容占位符 3">
+            <a:extLst>
+              <a:ext uri="{FF2B5EF4-FFF2-40B4-BE49-F238E27FC236}">
+                <a16:creationId xmlns:a16="http://schemas.microsoft.com/office/drawing/2014/main" id="{7B5218E0-5DE0-60D3-F782-41EE5A13FBFC}"/>
+              </a:ext>
+            </a:extLst>
+          </p:cNvPr>
+          <p:cNvPicPr>
+            <a:picLocks noChangeAspect="1"/>
+          </p:cNvPicPr>
+          <p:nvPr/>
+        </p:nvPicPr>
+        <p:blipFill>
+          <a:blip r:embed="rId3" cstate="print">
+            <a:extLst>
+              <a:ext uri="{28A0092B-C50C-407E-A947-70E740481C1C}">
+                <a14:useLocalDpi xmlns:a14="http://schemas.microsoft.com/office/drawing/2010/main" val="0"/>
+              </a:ext>
+            </a:extLst>
+          </a:blip>
+          <a:stretch>
+            <a:fillRect/>
+          </a:stretch>
+        </p:blipFill>
+        <p:spPr>
+          <a:xfrm>
+            <a:off x="7441790" y="2346311"/>
+            <a:ext cx="4374473" cy="3280855"/>
+          </a:xfrm>
+          <a:prstGeom prst="rect">
+            <a:avLst/>
+          </a:prstGeom>
+        </p:spPr>
+      </p:pic>
+      <p:sp>
+        <p:nvSpPr>
+          <p:cNvPr id="10" name="矩形 4">
+            <a:extLst>
+              <a:ext uri="{FF2B5EF4-FFF2-40B4-BE49-F238E27FC236}">
+                <a16:creationId xmlns:a16="http://schemas.microsoft.com/office/drawing/2014/main" id="{10A9A6E1-059D-870B-F7FB-CE495D7E200E}"/>
+              </a:ext>
+            </a:extLst>
+          </p:cNvPr>
+          <p:cNvSpPr/>
+          <p:nvPr/>
+        </p:nvSpPr>
+        <p:spPr>
+          <a:xfrm>
+            <a:off x="8105211" y="5619689"/>
+            <a:ext cx="3047629" cy="400110"/>
+          </a:xfrm>
+          <a:prstGeom prst="rect">
+            <a:avLst/>
+          </a:prstGeom>
+        </p:spPr>
+        <p:txBody>
+          <a:bodyPr wrap="none">
+            <a:spAutoFit/>
+          </a:bodyPr>
+          <a:lstStyle/>
+          <a:p>
+            <a:r>
+              <a:rPr lang="en-US" altLang="zh-CN" dirty="0">
+                <a:latin typeface="Bahnschrift" panose="020B0502040204020203" pitchFamily="34" charset="0"/>
+              </a:rPr>
+              <a:t>June 29</a:t>
+            </a:r>
+            <a:r>
+              <a:rPr lang="en-US" altLang="zh-CN" baseline="30000" dirty="0">
+                <a:latin typeface="Bahnschrift" panose="020B0502040204020203" pitchFamily="34" charset="0"/>
+              </a:rPr>
+              <a:t>th</a:t>
+            </a:r>
+            <a:r>
+              <a:rPr lang="en-US" altLang="zh-CN" dirty="0">
+                <a:latin typeface="Bahnschrift" panose="020B0502040204020203" pitchFamily="34" charset="0"/>
+              </a:rPr>
+              <a:t> , </a:t>
+            </a:r>
+            <a:r>
+              <a:rPr lang="en-US" altLang="zh-CN" sz="2000" dirty="0">
+                <a:latin typeface="Bahnschrift" panose="020B0502040204020203" pitchFamily="34" charset="0"/>
+              </a:rPr>
+              <a:t>Dinner</a:t>
+            </a:r>
+            <a:r>
+              <a:rPr lang="en-US" altLang="zh-CN" dirty="0">
+                <a:latin typeface="Bahnschrift" panose="020B0502040204020203" pitchFamily="34" charset="0"/>
+              </a:rPr>
+              <a:t> at Luigi’s</a:t>
+            </a:r>
+            <a:endParaRPr lang="en-US" altLang="zh-CN" baseline="30000" dirty="0">
+              <a:latin typeface="Bahnschrift" panose="020B0502040204020203" pitchFamily="34" charset="0"/>
+            </a:endParaRPr>
+          </a:p>
+        </p:txBody>
+      </p:sp>
+    </p:spTree>
+    <p:extLst>
+      <p:ext uri="{BB962C8B-B14F-4D97-AF65-F5344CB8AC3E}">
+        <p14:creationId xmlns:p14="http://schemas.microsoft.com/office/powerpoint/2010/main" val="666364713"/>
+      </p:ext>
+    </p:extLst>
+  </p:cSld>
+  <p:clrMapOvr>
+    <a:masterClrMapping/>
+  </p:clrMapOvr>
+</p:sld>
+</file>
+
+<file path=ppt/slides/slide13.xml><?xml version="1.0" encoding="utf-8"?>
+<p:sld xmlns:a="http://schemas.openxmlformats.org/drawingml/2006/main" xmlns:r="http://schemas.openxmlformats.org/officeDocument/2006/relationships" xmlns:p="http://schemas.openxmlformats.org/presentationml/2006/main">
+  <p:cSld>
+    <p:spTree>
+      <p:nvGrpSpPr>
+        <p:cNvPr id="1" name=""/>
+        <p:cNvGrpSpPr/>
+        <p:nvPr/>
+      </p:nvGrpSpPr>
+      <p:grpSpPr>
+        <a:xfrm>
+          <a:off x="0" y="0"/>
+          <a:ext cx="0" cy="0"/>
+          <a:chOff x="0" y="0"/>
+          <a:chExt cx="0" cy="0"/>
+        </a:xfrm>
+      </p:grpSpPr>
+      <p:sp>
+        <p:nvSpPr>
+          <p:cNvPr id="3" name="内容占位符 2"/>
+          <p:cNvSpPr>
+            <a:spLocks noGrp="1"/>
+          </p:cNvSpPr>
+          <p:nvPr>
+            <p:ph idx="1"/>
+          </p:nvPr>
+        </p:nvSpPr>
+        <p:spPr>
+          <a:xfrm>
+            <a:off x="1177333" y="3292963"/>
+            <a:ext cx="3170931" cy="695377"/>
+          </a:xfrm>
+        </p:spPr>
+        <p:txBody>
+          <a:bodyPr>
+            <a:normAutofit/>
+          </a:bodyPr>
+          <a:lstStyle/>
+          <a:p>
+            <a:pPr marL="0" indent="0">
+              <a:buNone/>
+            </a:pPr>
+            <a:r>
+              <a:rPr lang="en-US" altLang="zh-CN" sz="2000" dirty="0">
+                <a:latin typeface="Bahnschrift" panose="020B0502040204020203" pitchFamily="34" charset="0"/>
+                <a:cs typeface="Times New Roman" panose="02020603050405020304" pitchFamily="18" charset="0"/>
+              </a:rPr>
+              <a:t>Jacky teaching Peter to drive manual</a:t>
+            </a:r>
+          </a:p>
+        </p:txBody>
+      </p:sp>
+      <p:sp>
+        <p:nvSpPr>
+          <p:cNvPr id="9" name="TextBox 8">
+            <a:extLst>
+              <a:ext uri="{FF2B5EF4-FFF2-40B4-BE49-F238E27FC236}">
+                <a16:creationId xmlns:a16="http://schemas.microsoft.com/office/drawing/2014/main" id="{A8156FBE-6CD8-B2C3-4C30-27FFBB9D076C}"/>
+              </a:ext>
+            </a:extLst>
+          </p:cNvPr>
+          <p:cNvSpPr txBox="1"/>
+          <p:nvPr/>
+        </p:nvSpPr>
+        <p:spPr>
+          <a:xfrm>
+            <a:off x="0" y="0"/>
+            <a:ext cx="12192000" cy="1661993"/>
+          </a:xfrm>
+          <a:prstGeom prst="rect">
+            <a:avLst/>
+          </a:prstGeom>
+          <a:solidFill>
+            <a:schemeClr val="accent5">
+              <a:lumMod val="50000"/>
+            </a:schemeClr>
+          </a:solidFill>
+          <a:ln>
+            <a:noFill/>
+          </a:ln>
+        </p:spPr>
+        <p:txBody>
+          <a:bodyPr wrap="square" rtlCol="0">
+            <a:spAutoFit/>
+          </a:bodyPr>
+          <a:lstStyle/>
+          <a:p>
+            <a:pPr algn="ctr"/>
+            <a:endParaRPr lang="en-US" dirty="0"/>
+          </a:p>
+          <a:p>
+            <a:pPr algn="ctr"/>
+            <a:endParaRPr lang="en-US" dirty="0"/>
+          </a:p>
+          <a:p>
+            <a:pPr algn="ctr"/>
+            <a:r>
+              <a:rPr lang="en-US" sz="4800" b="1" dirty="0">
+                <a:solidFill>
+                  <a:schemeClr val="bg1"/>
+                </a:solidFill>
+                <a:latin typeface="Bahnschrift" panose="020B0502040204020203" pitchFamily="34" charset="0"/>
+              </a:rPr>
+              <a:t>7. Life (More Pictures)</a:t>
+            </a:r>
+            <a:endParaRPr lang="en-US" dirty="0"/>
+          </a:p>
+          <a:p>
+            <a:pPr algn="ctr"/>
+            <a:endParaRPr lang="en-US" dirty="0"/>
+          </a:p>
+        </p:txBody>
+      </p:sp>
+    </p:spTree>
+    <p:extLst>
+      <p:ext uri="{BB962C8B-B14F-4D97-AF65-F5344CB8AC3E}">
+        <p14:creationId xmlns:p14="http://schemas.microsoft.com/office/powerpoint/2010/main" val="1810179627"/>
+      </p:ext>
+    </p:extLst>
+  </p:cSld>
+  <p:clrMapOvr>
+    <a:masterClrMapping/>
+  </p:clrMapOvr>
+</p:sld>
+</file>
+
+<file path=ppt/slides/slide14.xml><?xml version="1.0" encoding="utf-8"?>
+<p:sld xmlns:a="http://schemas.openxmlformats.org/drawingml/2006/main" xmlns:r="http://schemas.openxmlformats.org/officeDocument/2006/relationships" xmlns:p="http://schemas.openxmlformats.org/presentationml/2006/main">
+  <p:cSld>
+    <p:spTree>
+      <p:nvGrpSpPr>
+        <p:cNvPr id="1" name=""/>
+        <p:cNvGrpSpPr/>
+        <p:nvPr/>
+      </p:nvGrpSpPr>
+      <p:grpSpPr>
+        <a:xfrm>
+          <a:off x="0" y="0"/>
+          <a:ext cx="0" cy="0"/>
+          <a:chOff x="0" y="0"/>
+          <a:chExt cx="0" cy="0"/>
+        </a:xfrm>
+      </p:grpSpPr>
+      <p:sp>
+        <p:nvSpPr>
+          <p:cNvPr id="3" name="内容占位符 2"/>
+          <p:cNvSpPr>
+            <a:spLocks noGrp="1"/>
+          </p:cNvSpPr>
+          <p:nvPr>
+            <p:ph idx="1"/>
+          </p:nvPr>
+        </p:nvSpPr>
+        <p:spPr>
+          <a:xfrm>
+            <a:off x="1683171" y="2757942"/>
+            <a:ext cx="8825659" cy="3261857"/>
+          </a:xfrm>
+        </p:spPr>
+        <p:txBody>
+          <a:bodyPr>
+            <a:normAutofit/>
+          </a:bodyPr>
+          <a:lstStyle/>
+          <a:p>
+            <a:r>
+              <a:rPr lang="en-US" altLang="zh-CN" sz="2000" dirty="0">
+                <a:latin typeface="Bahnschrift" panose="020B0502040204020203" pitchFamily="34" charset="0"/>
+                <a:cs typeface="Times New Roman" panose="02020603050405020304" pitchFamily="18" charset="0"/>
+              </a:rPr>
+              <a:t>Peter’s first shifts were August 2 – August 8</a:t>
+            </a:r>
+          </a:p>
+          <a:p>
+            <a:pPr lvl="1"/>
+            <a:r>
+              <a:rPr lang="en-US" altLang="zh-CN" sz="1600" dirty="0">
+                <a:latin typeface="Bahnschrift" panose="020B0502040204020203" pitchFamily="34" charset="0"/>
+                <a:cs typeface="Times New Roman" panose="02020603050405020304" pitchFamily="18" charset="0"/>
+              </a:rPr>
+              <a:t>Monitoring data quality for Tile modules</a:t>
+            </a:r>
+          </a:p>
+          <a:p>
+            <a:pPr lvl="1"/>
+            <a:r>
+              <a:rPr lang="en-US" altLang="zh-CN" sz="1600" dirty="0">
+                <a:latin typeface="Bahnschrift" panose="020B0502040204020203" pitchFamily="34" charset="0"/>
+                <a:cs typeface="Times New Roman" panose="02020603050405020304" pitchFamily="18" charset="0"/>
+              </a:rPr>
+              <a:t>Reporting on </a:t>
+            </a:r>
+            <a:r>
+              <a:rPr lang="en-US" altLang="zh-CN" sz="1600" dirty="0" err="1">
+                <a:latin typeface="Bahnschrift" panose="020B0502040204020203" pitchFamily="34" charset="0"/>
+                <a:cs typeface="Times New Roman" panose="02020603050405020304" pitchFamily="18" charset="0"/>
+              </a:rPr>
+              <a:t>LAr</a:t>
+            </a:r>
+            <a:r>
+              <a:rPr lang="en-US" altLang="zh-CN" sz="1600" dirty="0">
+                <a:latin typeface="Bahnschrift" panose="020B0502040204020203" pitchFamily="34" charset="0"/>
+                <a:cs typeface="Times New Roman" panose="02020603050405020304" pitchFamily="18" charset="0"/>
+              </a:rPr>
+              <a:t> status and major problems </a:t>
+            </a:r>
+          </a:p>
+          <a:p>
+            <a:pPr lvl="1"/>
+            <a:r>
+              <a:rPr lang="en-US" altLang="zh-CN" sz="1600" dirty="0">
+                <a:latin typeface="Bahnschrift" panose="020B0502040204020203" pitchFamily="34" charset="0"/>
+                <a:cs typeface="Times New Roman" panose="02020603050405020304" pitchFamily="18" charset="0"/>
+              </a:rPr>
+              <a:t>More shifts in late August and September</a:t>
+            </a:r>
+          </a:p>
+          <a:p>
+            <a:r>
+              <a:rPr lang="en-US" altLang="zh-CN" sz="2000" dirty="0">
+                <a:latin typeface="Bahnschrift" panose="020B0502040204020203" pitchFamily="34" charset="0"/>
+                <a:cs typeface="Times New Roman" panose="02020603050405020304" pitchFamily="18" charset="0"/>
+              </a:rPr>
+              <a:t>Jacky’s shift training is in late August, will take shifts next semester</a:t>
+            </a:r>
+          </a:p>
+          <a:p>
+            <a:endParaRPr lang="en-US" altLang="zh-CN" sz="2000" dirty="0">
+              <a:latin typeface="Bahnschrift" panose="020B0502040204020203" pitchFamily="34" charset="0"/>
+              <a:cs typeface="Times New Roman" panose="02020603050405020304" pitchFamily="18" charset="0"/>
+            </a:endParaRPr>
+          </a:p>
+        </p:txBody>
+      </p:sp>
+      <p:sp>
+        <p:nvSpPr>
+          <p:cNvPr id="9" name="TextBox 8">
+            <a:extLst>
+              <a:ext uri="{FF2B5EF4-FFF2-40B4-BE49-F238E27FC236}">
+                <a16:creationId xmlns:a16="http://schemas.microsoft.com/office/drawing/2014/main" id="{A8156FBE-6CD8-B2C3-4C30-27FFBB9D076C}"/>
+              </a:ext>
+            </a:extLst>
+          </p:cNvPr>
+          <p:cNvSpPr txBox="1"/>
+          <p:nvPr/>
+        </p:nvSpPr>
+        <p:spPr>
+          <a:xfrm>
+            <a:off x="0" y="0"/>
+            <a:ext cx="12192000" cy="1661993"/>
+          </a:xfrm>
+          <a:prstGeom prst="rect">
+            <a:avLst/>
+          </a:prstGeom>
+          <a:solidFill>
+            <a:schemeClr val="accent5">
+              <a:lumMod val="50000"/>
+            </a:schemeClr>
+          </a:solidFill>
+          <a:ln>
+            <a:noFill/>
+          </a:ln>
+        </p:spPr>
+        <p:txBody>
+          <a:bodyPr wrap="square" rtlCol="0">
+            <a:spAutoFit/>
+          </a:bodyPr>
+          <a:lstStyle/>
+          <a:p>
+            <a:pPr algn="ctr"/>
             <a:endParaRPr lang="en-US" dirty="0"/>
           </a:p>
           <a:p>
@@ -5072,7 +5345,7 @@
 </p:sld>
 </file>
 
-<file path=ppt/slides/slide13.xml><?xml version="1.0" encoding="utf-8"?>
+<file path=ppt/slides/slide15.xml><?xml version="1.0" encoding="utf-8"?>
 <p:sld xmlns:a="http://schemas.openxmlformats.org/drawingml/2006/main" xmlns:r="http://schemas.openxmlformats.org/officeDocument/2006/relationships" xmlns:p="http://schemas.openxmlformats.org/presentationml/2006/main">
   <p:cSld>
     <p:spTree>
@@ -5839,8 +6112,8 @@
         </p:nvSpPr>
         <p:spPr>
           <a:xfrm>
-            <a:off x="1683171" y="2757942"/>
-            <a:ext cx="8825659" cy="3261857"/>
+            <a:off x="0" y="1938993"/>
+            <a:ext cx="11410122" cy="1490008"/>
           </a:xfrm>
         </p:spPr>
         <p:txBody>
@@ -5854,7 +6127,37 @@
                 <a:latin typeface="Bahnschrift" panose="020B0502040204020203" pitchFamily="34" charset="0"/>
                 <a:cs typeface="Times New Roman" panose="02020603050405020304" pitchFamily="18" charset="0"/>
               </a:rPr>
-              <a:t>Connected with Filipe Martins</a:t>
+              <a:t>Overview:</a:t>
+            </a:r>
+          </a:p>
+          <a:p>
+            <a:pPr lvl="1"/>
+            <a:r>
+              <a:rPr lang="en-US" altLang="zh-CN" sz="2000" dirty="0">
+                <a:latin typeface="Bahnschrift" panose="020B0502040204020203" pitchFamily="34" charset="0"/>
+                <a:cs typeface="Times New Roman" panose="02020603050405020304" pitchFamily="18" charset="0"/>
+              </a:rPr>
+              <a:t>Monitoring the current supplied to 5V motherboards in Tile modules</a:t>
+            </a:r>
+          </a:p>
+          <a:p>
+            <a:pPr lvl="1"/>
+            <a:r>
+              <a:rPr lang="en-US" altLang="zh-CN" sz="2000" dirty="0">
+                <a:latin typeface="Bahnschrift" panose="020B0502040204020203" pitchFamily="34" charset="0"/>
+                <a:cs typeface="Times New Roman" panose="02020603050405020304" pitchFamily="18" charset="0"/>
+              </a:rPr>
+              <a:t>Currently, there is an online database. We want to collect this data to monitor current trips and integrate it with current systems</a:t>
+            </a:r>
+          </a:p>
+          <a:p>
+            <a:pPr lvl="1"/>
+            <a:r>
+              <a:rPr lang="en-US" altLang="zh-CN" sz="2000" dirty="0">
+                <a:latin typeface="Bahnschrift" panose="020B0502040204020203" pitchFamily="34" charset="0"/>
+                <a:cs typeface="Times New Roman" panose="02020603050405020304" pitchFamily="18" charset="0"/>
+              </a:rPr>
+              <a:t>DDV applies “smoothing” to DCS: it only updates if the current change is outside a given interval</a:t>
             </a:r>
           </a:p>
           <a:p>
@@ -5862,66 +6165,6 @@
               <a:latin typeface="Bahnschrift" panose="020B0502040204020203" pitchFamily="34" charset="0"/>
               <a:cs typeface="Times New Roman" panose="02020603050405020304" pitchFamily="18" charset="0"/>
             </a:endParaRPr>
-          </a:p>
-          <a:p>
-            <a:r>
-              <a:rPr lang="en-US" altLang="zh-CN" sz="2000" dirty="0">
-                <a:latin typeface="Bahnschrift" panose="020B0502040204020203" pitchFamily="34" charset="0"/>
-                <a:cs typeface="Times New Roman" panose="02020603050405020304" pitchFamily="18" charset="0"/>
-              </a:rPr>
-              <a:t>Done:</a:t>
-            </a:r>
-          </a:p>
-          <a:p>
-            <a:r>
-              <a:rPr lang="en-US" altLang="zh-CN" sz="2000" dirty="0">
-                <a:latin typeface="Bahnschrift" panose="020B0502040204020203" pitchFamily="34" charset="0"/>
-                <a:cs typeface="Times New Roman" panose="02020603050405020304" pitchFamily="18" charset="0"/>
-              </a:rPr>
-              <a:t>Generated code for checking DCS values (Pending checking with Filipe)</a:t>
-            </a:r>
-          </a:p>
-          <a:p>
-            <a:endParaRPr lang="en-US" altLang="zh-CN" sz="2000" dirty="0">
-              <a:latin typeface="Bahnschrift" panose="020B0502040204020203" pitchFamily="34" charset="0"/>
-              <a:cs typeface="Times New Roman" panose="02020603050405020304" pitchFamily="18" charset="0"/>
-            </a:endParaRPr>
-          </a:p>
-          <a:p>
-            <a:r>
-              <a:rPr lang="en-US" altLang="zh-CN" sz="2000" dirty="0">
-                <a:latin typeface="Bahnschrift" panose="020B0502040204020203" pitchFamily="34" charset="0"/>
-                <a:cs typeface="Times New Roman" panose="02020603050405020304" pitchFamily="18" charset="0"/>
-              </a:rPr>
-              <a:t>To do:</a:t>
-            </a:r>
-          </a:p>
-          <a:p>
-            <a:r>
-              <a:rPr lang="en-US" altLang="zh-CN" sz="2000" dirty="0">
-                <a:latin typeface="Bahnschrift" panose="020B0502040204020203" pitchFamily="34" charset="0"/>
-                <a:cs typeface="Times New Roman" panose="02020603050405020304" pitchFamily="18" charset="0"/>
-              </a:rPr>
-              <a:t>Put the code into TIO</a:t>
-            </a:r>
-          </a:p>
-          <a:p>
-            <a:r>
-              <a:rPr lang="en-US" altLang="zh-CN" sz="2000" dirty="0">
-                <a:latin typeface="Bahnschrift" panose="020B0502040204020203" pitchFamily="34" charset="0"/>
-                <a:cs typeface="Times New Roman" panose="02020603050405020304" pitchFamily="18" charset="0"/>
-              </a:rPr>
-              <a:t>…</a:t>
-            </a:r>
-          </a:p>
-          <a:p>
-            <a:r>
-              <a:rPr lang="en-US" altLang="zh-CN" sz="2000" dirty="0">
-                <a:latin typeface="Bahnschrift" panose="020B0502040204020203" pitchFamily="34" charset="0"/>
-                <a:cs typeface="Times New Roman" panose="02020603050405020304" pitchFamily="18" charset="0"/>
-              </a:rPr>
-              <a:t>…</a:t>
-            </a:r>
           </a:p>
           <a:p>
             <a:endParaRPr lang="en-US" altLang="zh-CN" sz="2000" dirty="0">
@@ -5992,6 +6235,72 @@
           <a:p>
             <a:pPr algn="ctr"/>
             <a:endParaRPr lang="en-US" dirty="0"/>
+          </a:p>
+        </p:txBody>
+      </p:sp>
+      <p:pic>
+        <p:nvPicPr>
+          <p:cNvPr id="4" name="Picture 3">
+            <a:extLst>
+              <a:ext uri="{FF2B5EF4-FFF2-40B4-BE49-F238E27FC236}">
+                <a16:creationId xmlns:a16="http://schemas.microsoft.com/office/drawing/2014/main" id="{D01E5A39-78C9-3AC6-273E-3BD675288B23}"/>
+              </a:ext>
+            </a:extLst>
+          </p:cNvPr>
+          <p:cNvPicPr>
+            <a:picLocks noChangeAspect="1"/>
+          </p:cNvPicPr>
+          <p:nvPr/>
+        </p:nvPicPr>
+        <p:blipFill rotWithShape="1">
+          <a:blip r:embed="rId2"/>
+          <a:srcRect l="1596" t="14184" r="2500" b="6525"/>
+          <a:stretch/>
+        </p:blipFill>
+        <p:spPr>
+          <a:xfrm>
+            <a:off x="805069" y="3502817"/>
+            <a:ext cx="7214543" cy="3355183"/>
+          </a:xfrm>
+          <a:prstGeom prst="rect">
+            <a:avLst/>
+          </a:prstGeom>
+        </p:spPr>
+      </p:pic>
+      <p:sp>
+        <p:nvSpPr>
+          <p:cNvPr id="5" name="TextBox 4">
+            <a:extLst>
+              <a:ext uri="{FF2B5EF4-FFF2-40B4-BE49-F238E27FC236}">
+                <a16:creationId xmlns:a16="http://schemas.microsoft.com/office/drawing/2014/main" id="{671EDD80-0ACF-0438-9CFB-E6B6C646BDA2}"/>
+              </a:ext>
+            </a:extLst>
+          </p:cNvPr>
+          <p:cNvSpPr txBox="1"/>
+          <p:nvPr/>
+        </p:nvSpPr>
+        <p:spPr>
+          <a:xfrm>
+            <a:off x="8249055" y="4348264"/>
+            <a:ext cx="1799617" cy="646331"/>
+          </a:xfrm>
+          <a:prstGeom prst="rect">
+            <a:avLst/>
+          </a:prstGeom>
+          <a:noFill/>
+        </p:spPr>
+        <p:txBody>
+          <a:bodyPr wrap="square" rtlCol="0">
+            <a:spAutoFit/>
+          </a:bodyPr>
+          <a:lstStyle/>
+          <a:p>
+            <a:r>
+              <a:rPr lang="en-US" dirty="0">
+                <a:latin typeface="Bahnschrift" panose="020B0502040204020203" pitchFamily="34" charset="0"/>
+              </a:rPr>
+              <a:t>Online DDV data/plotting </a:t>
+            </a:r>
           </a:p>
         </p:txBody>
       </p:sp>
@@ -6037,22 +6346,120 @@
         </p:nvSpPr>
         <p:spPr>
           <a:xfrm>
-            <a:off x="1683171" y="2757942"/>
-            <a:ext cx="8825659" cy="3261857"/>
+            <a:off x="1683172" y="2757942"/>
+            <a:ext cx="6784968" cy="3261857"/>
           </a:xfrm>
         </p:spPr>
         <p:txBody>
           <a:bodyPr>
-            <a:normAutofit/>
+            <a:normAutofit fontScale="25000" lnSpcReduction="20000"/>
           </a:bodyPr>
           <a:lstStyle/>
           <a:p>
-            <a:r>
-              <a:rPr lang="en-US" altLang="zh-CN" sz="2000" dirty="0">
+            <a:pPr marL="0" indent="0">
+              <a:buNone/>
+            </a:pPr>
+            <a:endParaRPr lang="en-US" altLang="zh-CN" sz="8000" dirty="0">
+              <a:latin typeface="Bahnschrift" panose="020B0502040204020203" pitchFamily="34" charset="0"/>
+              <a:cs typeface="Times New Roman" panose="02020603050405020304" pitchFamily="18" charset="0"/>
+            </a:endParaRPr>
+          </a:p>
+          <a:p>
+            <a:r>
+              <a:rPr lang="en-US" altLang="zh-CN" sz="8000" dirty="0">
                 <a:latin typeface="Bahnschrift" panose="020B0502040204020203" pitchFamily="34" charset="0"/>
                 <a:cs typeface="Times New Roman" panose="02020603050405020304" pitchFamily="18" charset="0"/>
               </a:rPr>
-              <a:t>Connected with Danijela Bogavac</a:t>
+              <a:t>Done:</a:t>
+            </a:r>
+          </a:p>
+          <a:p>
+            <a:pPr lvl="1"/>
+            <a:r>
+              <a:rPr lang="en-US" altLang="zh-CN" sz="8000" dirty="0">
+                <a:latin typeface="Bahnschrift" panose="020B0502040204020203" pitchFamily="34" charset="0"/>
+                <a:cs typeface="Times New Roman" panose="02020603050405020304" pitchFamily="18" charset="0"/>
+              </a:rPr>
+              <a:t>Connected with Felipe Martins</a:t>
+            </a:r>
+          </a:p>
+          <a:p>
+            <a:pPr lvl="1"/>
+            <a:r>
+              <a:rPr lang="en-US" altLang="zh-CN" sz="8000" dirty="0">
+                <a:latin typeface="Bahnschrift" panose="020B0502040204020203" pitchFamily="34" charset="0"/>
+                <a:cs typeface="Times New Roman" panose="02020603050405020304" pitchFamily="18" charset="0"/>
+              </a:rPr>
+              <a:t>Generated code for accessing/checking DCS values</a:t>
+            </a:r>
+          </a:p>
+          <a:p>
+            <a:pPr lvl="1"/>
+            <a:r>
+              <a:rPr lang="en-US" altLang="zh-CN" sz="8000" dirty="0">
+                <a:latin typeface="Bahnschrift" panose="020B0502040204020203" pitchFamily="34" charset="0"/>
+                <a:cs typeface="Times New Roman" panose="02020603050405020304" pitchFamily="18" charset="0"/>
+              </a:rPr>
+              <a:t>Became familiar with some legacy code </a:t>
+            </a:r>
+          </a:p>
+          <a:p>
+            <a:pPr lvl="1"/>
+            <a:r>
+              <a:rPr lang="en-US" altLang="zh-CN" sz="8000" dirty="0">
+                <a:latin typeface="Bahnschrift" panose="020B0502040204020203" pitchFamily="34" charset="0"/>
+                <a:cs typeface="Times New Roman" panose="02020603050405020304" pitchFamily="18" charset="0"/>
+              </a:rPr>
+              <a:t>Added new functionalities: time-averaging of current</a:t>
+            </a:r>
+          </a:p>
+          <a:p>
+            <a:endParaRPr lang="en-US" altLang="zh-CN" sz="8000" dirty="0">
+              <a:latin typeface="Bahnschrift" panose="020B0502040204020203" pitchFamily="34" charset="0"/>
+              <a:cs typeface="Times New Roman" panose="02020603050405020304" pitchFamily="18" charset="0"/>
+            </a:endParaRPr>
+          </a:p>
+          <a:p>
+            <a:r>
+              <a:rPr lang="en-US" altLang="zh-CN" sz="8000" dirty="0">
+                <a:latin typeface="Bahnschrift" panose="020B0502040204020203" pitchFamily="34" charset="0"/>
+                <a:cs typeface="Times New Roman" panose="02020603050405020304" pitchFamily="18" charset="0"/>
+              </a:rPr>
+              <a:t>To do:</a:t>
+            </a:r>
+          </a:p>
+          <a:p>
+            <a:pPr lvl="1"/>
+            <a:r>
+              <a:rPr lang="en-US" altLang="zh-CN" sz="8000" dirty="0">
+                <a:latin typeface="Bahnschrift" panose="020B0502040204020203" pitchFamily="34" charset="0"/>
+                <a:cs typeface="Times New Roman" panose="02020603050405020304" pitchFamily="18" charset="0"/>
+              </a:rPr>
+              <a:t>Integrate the code into TIO (online monitoring system)</a:t>
+            </a:r>
+          </a:p>
+          <a:p>
+            <a:pPr lvl="1"/>
+            <a:r>
+              <a:rPr lang="en-US" altLang="zh-CN" sz="8000" dirty="0">
+                <a:latin typeface="Bahnschrift" panose="020B0502040204020203" pitchFamily="34" charset="0"/>
+                <a:cs typeface="Times New Roman" panose="02020603050405020304" pitchFamily="18" charset="0"/>
+              </a:rPr>
+              <a:t>Connect with Sergei </a:t>
+            </a:r>
+            <a:r>
+              <a:rPr lang="en-US" altLang="zh-CN" sz="8000" dirty="0" err="1">
+                <a:latin typeface="Bahnschrift" panose="020B0502040204020203" pitchFamily="34" charset="0"/>
+                <a:cs typeface="Times New Roman" panose="02020603050405020304" pitchFamily="18" charset="0"/>
+              </a:rPr>
+              <a:t>Chekalev</a:t>
+            </a:r>
+            <a:r>
+              <a:rPr lang="en-US" altLang="zh-CN" sz="8000" dirty="0">
+                <a:latin typeface="Bahnschrift" panose="020B0502040204020203" pitchFamily="34" charset="0"/>
+                <a:cs typeface="Times New Roman" panose="02020603050405020304" pitchFamily="18" charset="0"/>
+              </a:rPr>
+              <a:t> </a:t>
             </a:r>
           </a:p>
           <a:p>
@@ -6061,54 +6468,6 @@
               <a:cs typeface="Times New Roman" panose="02020603050405020304" pitchFamily="18" charset="0"/>
             </a:endParaRPr>
           </a:p>
-          <a:p>
-            <a:r>
-              <a:rPr lang="en-US" altLang="zh-CN" sz="2000" dirty="0">
-                <a:latin typeface="Bahnschrift" panose="020B0502040204020203" pitchFamily="34" charset="0"/>
-                <a:cs typeface="Times New Roman" panose="02020603050405020304" pitchFamily="18" charset="0"/>
-              </a:rPr>
-              <a:t>Done:</a:t>
-            </a:r>
-          </a:p>
-          <a:p>
-            <a:r>
-              <a:rPr lang="en-US" altLang="zh-CN" sz="2000" dirty="0">
-                <a:latin typeface="Bahnschrift" panose="020B0502040204020203" pitchFamily="34" charset="0"/>
-                <a:cs typeface="Times New Roman" panose="02020603050405020304" pitchFamily="18" charset="0"/>
-              </a:rPr>
-              <a:t>Given overview of system and a tour in control room</a:t>
-            </a:r>
-          </a:p>
-          <a:p>
-            <a:endParaRPr lang="en-US" altLang="zh-CN" sz="2000" dirty="0">
-              <a:latin typeface="Bahnschrift" panose="020B0502040204020203" pitchFamily="34" charset="0"/>
-              <a:cs typeface="Times New Roman" panose="02020603050405020304" pitchFamily="18" charset="0"/>
-            </a:endParaRPr>
-          </a:p>
-          <a:p>
-            <a:r>
-              <a:rPr lang="en-US" altLang="zh-CN" sz="2000" dirty="0">
-                <a:latin typeface="Bahnschrift" panose="020B0502040204020203" pitchFamily="34" charset="0"/>
-                <a:cs typeface="Times New Roman" panose="02020603050405020304" pitchFamily="18" charset="0"/>
-              </a:rPr>
-              <a:t>To do:</a:t>
-            </a:r>
-          </a:p>
-          <a:p>
-            <a:r>
-              <a:rPr lang="en-US" altLang="zh-CN" sz="2000" dirty="0">
-                <a:latin typeface="Bahnschrift" panose="020B0502040204020203" pitchFamily="34" charset="0"/>
-                <a:cs typeface="Times New Roman" panose="02020603050405020304" pitchFamily="18" charset="0"/>
-              </a:rPr>
-              <a:t>Codes review? </a:t>
-            </a:r>
-          </a:p>
-          <a:p>
-            <a:endParaRPr lang="en-US" altLang="zh-CN" sz="2000" dirty="0">
-              <a:latin typeface="Bahnschrift" panose="020B0502040204020203" pitchFamily="34" charset="0"/>
-              <a:cs typeface="Times New Roman" panose="02020603050405020304" pitchFamily="18" charset="0"/>
-            </a:endParaRPr>
-          </a:p>
         </p:txBody>
       </p:sp>
       <p:sp>
@@ -6126,7 +6485,7 @@
         <p:spPr>
           <a:xfrm>
             <a:off x="0" y="0"/>
-            <a:ext cx="12192000" cy="1661993"/>
+            <a:ext cx="12192000" cy="1938992"/>
           </a:xfrm>
           <a:prstGeom prst="rect">
             <a:avLst/>
@@ -6162,8 +6521,11 @@
                 </a:solidFill>
                 <a:latin typeface="Bahnschrift" panose="020B0502040204020203" pitchFamily="34" charset="0"/>
               </a:rPr>
-              <a:t>3. L1 Trigger System</a:t>
-            </a:r>
+              <a:t>2. LVPS/DCS Monitoring</a:t>
+            </a:r>
+          </a:p>
+          <a:p>
+            <a:pPr algn="ctr"/>
             <a:endParaRPr lang="en-US" dirty="0"/>
           </a:p>
           <a:p>
@@ -6175,7 +6537,7 @@
     </p:spTree>
     <p:extLst>
       <p:ext uri="{BB962C8B-B14F-4D97-AF65-F5344CB8AC3E}">
-        <p14:creationId xmlns:p14="http://schemas.microsoft.com/office/powerpoint/2010/main" val="3944741202"/>
+        <p14:creationId xmlns:p14="http://schemas.microsoft.com/office/powerpoint/2010/main" val="3914049752"/>
       </p:ext>
     </p:extLst>
   </p:cSld>
@@ -6214,8 +6576,8 @@
         </p:nvSpPr>
         <p:spPr>
           <a:xfrm>
-            <a:off x="1683171" y="2757942"/>
-            <a:ext cx="8825659" cy="3261857"/>
+            <a:off x="1683172" y="2757942"/>
+            <a:ext cx="6784968" cy="3261857"/>
           </a:xfrm>
         </p:spPr>
         <p:txBody>
@@ -6224,68 +6586,23 @@
           </a:bodyPr>
           <a:lstStyle/>
           <a:p>
-            <a:r>
-              <a:rPr lang="en-US" altLang="zh-CN" sz="2000" dirty="0">
-                <a:latin typeface="Bahnschrift" panose="020B0502040204020203" pitchFamily="34" charset="0"/>
-                <a:cs typeface="Times New Roman" panose="02020603050405020304" pitchFamily="18" charset="0"/>
-              </a:rPr>
-              <a:t>Knowledge Transferred from Dawit</a:t>
-            </a:r>
-          </a:p>
-          <a:p>
+            <a:pPr marL="0" indent="0">
+              <a:buNone/>
+            </a:pPr>
+            <a:endParaRPr lang="en-US" altLang="zh-CN" sz="8000" dirty="0">
+              <a:latin typeface="Bahnschrift" panose="020B0502040204020203" pitchFamily="34" charset="0"/>
+              <a:cs typeface="Times New Roman" panose="02020603050405020304" pitchFamily="18" charset="0"/>
+            </a:endParaRPr>
+          </a:p>
+          <a:p>
+            <a:pPr marL="0" indent="0">
+              <a:buNone/>
+            </a:pPr>
             <a:endParaRPr lang="en-US" altLang="zh-CN" sz="2000" dirty="0">
               <a:latin typeface="Bahnschrift" panose="020B0502040204020203" pitchFamily="34" charset="0"/>
               <a:cs typeface="Times New Roman" panose="02020603050405020304" pitchFamily="18" charset="0"/>
             </a:endParaRPr>
           </a:p>
-          <a:p>
-            <a:r>
-              <a:rPr lang="en-US" altLang="zh-CN" sz="2000" dirty="0">
-                <a:latin typeface="Bahnschrift" panose="020B0502040204020203" pitchFamily="34" charset="0"/>
-                <a:cs typeface="Times New Roman" panose="02020603050405020304" pitchFamily="18" charset="0"/>
-              </a:rPr>
-              <a:t>Done:</a:t>
-            </a:r>
-          </a:p>
-          <a:p>
-            <a:r>
-              <a:rPr lang="en-US" altLang="zh-CN" sz="2000" dirty="0">
-                <a:latin typeface="Bahnschrift" panose="020B0502040204020203" pitchFamily="34" charset="0"/>
-                <a:cs typeface="Times New Roman" panose="02020603050405020304" pitchFamily="18" charset="0"/>
-              </a:rPr>
-              <a:t>Recreated plots</a:t>
-            </a:r>
-          </a:p>
-          <a:p>
-            <a:endParaRPr lang="en-US" altLang="zh-CN" sz="2000" dirty="0">
-              <a:latin typeface="Bahnschrift" panose="020B0502040204020203" pitchFamily="34" charset="0"/>
-              <a:cs typeface="Times New Roman" panose="02020603050405020304" pitchFamily="18" charset="0"/>
-            </a:endParaRPr>
-          </a:p>
-          <a:p>
-            <a:r>
-              <a:rPr lang="en-US" altLang="zh-CN" sz="2000" dirty="0">
-                <a:latin typeface="Bahnschrift" panose="020B0502040204020203" pitchFamily="34" charset="0"/>
-                <a:cs typeface="Times New Roman" panose="02020603050405020304" pitchFamily="18" charset="0"/>
-              </a:rPr>
-              <a:t>To do:</a:t>
-            </a:r>
-          </a:p>
-          <a:p>
-            <a:r>
-              <a:rPr lang="en-US" altLang="zh-CN" sz="2000" dirty="0">
-                <a:latin typeface="Bahnschrift" panose="020B0502040204020203" pitchFamily="34" charset="0"/>
-                <a:cs typeface="Times New Roman" panose="02020603050405020304" pitchFamily="18" charset="0"/>
-              </a:rPr>
-              <a:t>None, until further notice.</a:t>
-            </a:r>
-          </a:p>
-          <a:p>
-            <a:endParaRPr lang="en-US" altLang="zh-CN" sz="2000" dirty="0">
-              <a:latin typeface="Bahnschrift" panose="020B0502040204020203" pitchFamily="34" charset="0"/>
-              <a:cs typeface="Times New Roman" panose="02020603050405020304" pitchFamily="18" charset="0"/>
-            </a:endParaRPr>
-          </a:p>
         </p:txBody>
       </p:sp>
       <p:sp>
@@ -6302,8 +6619,8 @@
         </p:nvSpPr>
         <p:spPr>
           <a:xfrm>
-            <a:off x="0" y="0"/>
-            <a:ext cx="12192000" cy="1661993"/>
+            <a:off x="0" y="-48638"/>
+            <a:ext cx="12192000" cy="1938992"/>
           </a:xfrm>
           <a:prstGeom prst="rect">
             <a:avLst/>
@@ -6339,20 +6656,316 @@
                 </a:solidFill>
                 <a:latin typeface="Bahnschrift" panose="020B0502040204020203" pitchFamily="34" charset="0"/>
               </a:rPr>
-              <a:t>4. Fast Calo Simulation (FCS)</a:t>
-            </a:r>
-            <a:endParaRPr lang="en-US" dirty="0"/>
+              <a:t>3. L1 Calo Trigger System</a:t>
+            </a:r>
           </a:p>
           <a:p>
             <a:pPr algn="ctr"/>
             <a:endParaRPr lang="en-US" dirty="0"/>
+          </a:p>
+          <a:p>
+            <a:pPr algn="ctr"/>
+            <a:endParaRPr lang="en-US" dirty="0"/>
+          </a:p>
+        </p:txBody>
+      </p:sp>
+      <p:pic>
+        <p:nvPicPr>
+          <p:cNvPr id="5" name="Picture 4">
+            <a:extLst>
+              <a:ext uri="{FF2B5EF4-FFF2-40B4-BE49-F238E27FC236}">
+                <a16:creationId xmlns:a16="http://schemas.microsoft.com/office/drawing/2014/main" id="{37F0AFBA-8EA1-BCFE-B656-ECDB73605EAA}"/>
+              </a:ext>
+            </a:extLst>
+          </p:cNvPr>
+          <p:cNvPicPr>
+            <a:picLocks noChangeAspect="1"/>
+          </p:cNvPicPr>
+          <p:nvPr/>
+        </p:nvPicPr>
+        <p:blipFill rotWithShape="1">
+          <a:blip r:embed="rId2"/>
+          <a:srcRect l="13805" t="22837" r="44349" b="32340"/>
+          <a:stretch/>
+        </p:blipFill>
+        <p:spPr>
+          <a:xfrm>
+            <a:off x="6913552" y="2089822"/>
+            <a:ext cx="5007620" cy="3017199"/>
+          </a:xfrm>
+          <a:prstGeom prst="rect">
+            <a:avLst/>
+          </a:prstGeom>
+        </p:spPr>
+      </p:pic>
+      <mc:AlternateContent xmlns:mc="http://schemas.openxmlformats.org/markup-compatibility/2006">
+        <mc:Choice xmlns:a14="http://schemas.microsoft.com/office/drawing/2010/main" Requires="a14">
+          <p:sp>
+            <p:nvSpPr>
+              <p:cNvPr id="8" name="TextBox 7">
+                <a:extLst>
+                  <a:ext uri="{FF2B5EF4-FFF2-40B4-BE49-F238E27FC236}">
+                    <a16:creationId xmlns:a16="http://schemas.microsoft.com/office/drawing/2014/main" id="{4F3FE831-67DE-FC6D-6192-6A7EAE320CB9}"/>
+                  </a:ext>
+                </a:extLst>
+              </p:cNvPr>
+              <p:cNvSpPr txBox="1"/>
+              <p:nvPr/>
+            </p:nvSpPr>
+            <p:spPr>
+              <a:xfrm>
+                <a:off x="663913" y="2005514"/>
+                <a:ext cx="4708712" cy="3785652"/>
+              </a:xfrm>
+              <a:prstGeom prst="rect">
+                <a:avLst/>
+              </a:prstGeom>
+              <a:noFill/>
+            </p:spPr>
+            <p:txBody>
+              <a:bodyPr wrap="square">
+                <a:spAutoFit/>
+              </a:bodyPr>
+              <a:lstStyle/>
+              <a:p>
+                <a:pPr marL="342900" indent="-342900">
+                  <a:buFont typeface="Arial" panose="020B0604020202020204" pitchFamily="34" charset="0"/>
+                  <a:buChar char="•"/>
+                </a:pPr>
+                <a:r>
+                  <a:rPr lang="en-US" altLang="zh-CN" sz="2000" dirty="0">
+                    <a:latin typeface="Bahnschrift" panose="020B0502040204020203" pitchFamily="34" charset="0"/>
+                    <a:cs typeface="Times New Roman" panose="02020603050405020304" pitchFamily="18" charset="0"/>
+                  </a:rPr>
+                  <a:t>Connected with Danijela Bogavac</a:t>
+                </a:r>
+              </a:p>
+              <a:p>
+                <a:pPr marL="342900" indent="-342900">
+                  <a:buFont typeface="Arial" panose="020B0604020202020204" pitchFamily="34" charset="0"/>
+                  <a:buChar char="•"/>
+                </a:pPr>
+                <a:r>
+                  <a:rPr lang="en-US" altLang="zh-CN" sz="2000" dirty="0">
+                    <a:latin typeface="Bahnschrift" panose="020B0502040204020203" pitchFamily="34" charset="0"/>
+                    <a:cs typeface="Times New Roman" panose="02020603050405020304" pitchFamily="18" charset="0"/>
+                  </a:rPr>
+                  <a:t>Overview of system:</a:t>
+                </a:r>
+              </a:p>
+              <a:p>
+                <a:pPr marL="800100" lvl="1" indent="-342900">
+                  <a:buFont typeface="Arial" panose="020B0604020202020204" pitchFamily="34" charset="0"/>
+                  <a:buChar char="•"/>
+                </a:pPr>
+                <a:r>
+                  <a:rPr lang="en-US" altLang="zh-CN" sz="2000" dirty="0">
+                    <a:latin typeface="Bahnschrift" panose="020B0502040204020203" pitchFamily="34" charset="0"/>
+                    <a:cs typeface="Times New Roman" panose="02020603050405020304" pitchFamily="18" charset="0"/>
+                  </a:rPr>
+                  <a:t>Towers are collections of PMTs and front-end electronics that sum events covering </a:t>
+                </a:r>
+                <a14:m>
+                  <m:oMath xmlns:m="http://schemas.openxmlformats.org/officeDocument/2006/math">
+                    <m:r>
+                      <m:rPr>
+                        <m:sty m:val="p"/>
+                      </m:rPr>
+                      <a:rPr lang="en-US" altLang="zh-CN" sz="2000" b="0" i="0" smtClean="0">
+                        <a:latin typeface="Cambria Math" panose="02040503050406030204" pitchFamily="18" charset="0"/>
+                        <a:cs typeface="Times New Roman" panose="02020603050405020304" pitchFamily="18" charset="0"/>
+                      </a:rPr>
+                      <m:t>Δ</m:t>
+                    </m:r>
+                    <m:r>
+                      <a:rPr lang="en-US" altLang="zh-CN" sz="2000" b="0" i="1" smtClean="0">
+                        <a:latin typeface="Cambria Math" panose="02040503050406030204" pitchFamily="18" charset="0"/>
+                        <a:cs typeface="Times New Roman" panose="02020603050405020304" pitchFamily="18" charset="0"/>
+                      </a:rPr>
+                      <m:t>𝜂</m:t>
+                    </m:r>
+                    <m:r>
+                      <a:rPr lang="en-US" altLang="zh-CN" sz="2000" b="0" i="1" smtClean="0">
+                        <a:latin typeface="Cambria Math" panose="02040503050406030204" pitchFamily="18" charset="0"/>
+                        <a:cs typeface="Times New Roman" panose="02020603050405020304" pitchFamily="18" charset="0"/>
+                      </a:rPr>
+                      <m:t>×</m:t>
+                    </m:r>
+                    <m:r>
+                      <m:rPr>
+                        <m:sty m:val="p"/>
+                      </m:rPr>
+                      <a:rPr lang="en-US" altLang="zh-CN" sz="2000" b="0" i="0" smtClean="0">
+                        <a:latin typeface="Cambria Math" panose="02040503050406030204" pitchFamily="18" charset="0"/>
+                        <a:cs typeface="Times New Roman" panose="02020603050405020304" pitchFamily="18" charset="0"/>
+                      </a:rPr>
+                      <m:t>Δ</m:t>
+                    </m:r>
+                    <m:r>
+                      <a:rPr lang="en-US" altLang="zh-CN" sz="2000" b="0" i="1" smtClean="0">
+                        <a:latin typeface="Cambria Math" panose="02040503050406030204" pitchFamily="18" charset="0"/>
+                        <a:cs typeface="Times New Roman" panose="02020603050405020304" pitchFamily="18" charset="0"/>
+                      </a:rPr>
+                      <m:t>𝜑</m:t>
+                    </m:r>
+                    <m:r>
+                      <a:rPr lang="en-US" altLang="zh-CN" sz="2000" b="0" i="1" smtClean="0">
+                        <a:latin typeface="Cambria Math" panose="02040503050406030204" pitchFamily="18" charset="0"/>
+                        <a:cs typeface="Times New Roman" panose="02020603050405020304" pitchFamily="18" charset="0"/>
+                      </a:rPr>
+                      <m:t>=0.1×0.1</m:t>
+                    </m:r>
+                  </m:oMath>
+                </a14:m>
+                <a:r>
+                  <a:rPr lang="en-US" altLang="zh-CN" sz="2000" dirty="0">
+                    <a:latin typeface="Bahnschrift" panose="020B0502040204020203" pitchFamily="34" charset="0"/>
+                    <a:cs typeface="Times New Roman" panose="02020603050405020304" pitchFamily="18" charset="0"/>
+                  </a:rPr>
+                  <a:t> to produce trigger signals</a:t>
+                </a:r>
+              </a:p>
+              <a:p>
+                <a:pPr marL="342900" indent="-342900">
+                  <a:buFont typeface="Arial" panose="020B0604020202020204" pitchFamily="34" charset="0"/>
+                  <a:buChar char="•"/>
+                </a:pPr>
+                <a:r>
+                  <a:rPr lang="en-US" altLang="zh-CN" sz="2000" dirty="0">
+                    <a:latin typeface="Bahnschrift" panose="020B0502040204020203" pitchFamily="34" charset="0"/>
+                    <a:cs typeface="Times New Roman" panose="02020603050405020304" pitchFamily="18" charset="0"/>
+                  </a:rPr>
+                  <a:t>Goals:</a:t>
+                </a:r>
+              </a:p>
+              <a:p>
+                <a:pPr marL="800100" lvl="1" indent="-342900">
+                  <a:buFont typeface="Arial" panose="020B0604020202020204" pitchFamily="34" charset="0"/>
+                  <a:buChar char="•"/>
+                </a:pPr>
+                <a:r>
+                  <a:rPr lang="en-US" altLang="zh-CN" sz="1600" dirty="0">
+                    <a:latin typeface="Bahnschrift" panose="020B0502040204020203" pitchFamily="34" charset="0"/>
+                    <a:cs typeface="Times New Roman" panose="02020603050405020304" pitchFamily="18" charset="0"/>
+                  </a:rPr>
+                  <a:t>Monitoring of trigger rates in the L1 Calo</a:t>
+                </a:r>
+              </a:p>
+              <a:p>
+                <a:pPr marL="800100" lvl="1" indent="-342900">
+                  <a:buFont typeface="Arial" panose="020B0604020202020204" pitchFamily="34" charset="0"/>
+                  <a:buChar char="•"/>
+                </a:pPr>
+                <a:r>
+                  <a:rPr lang="en-US" altLang="zh-CN" sz="1600" dirty="0">
+                    <a:latin typeface="Bahnschrift" panose="020B0502040204020203" pitchFamily="34" charset="0"/>
+                    <a:cs typeface="Times New Roman" panose="02020603050405020304" pitchFamily="18" charset="0"/>
+                  </a:rPr>
+                  <a:t>Integrate with Data Quality Monitoring Display (DQMD) in ACR</a:t>
+                </a:r>
+              </a:p>
+              <a:p>
+                <a:pPr marL="800100" lvl="1" indent="-342900">
+                  <a:buFont typeface="Arial" panose="020B0604020202020204" pitchFamily="34" charset="0"/>
+                  <a:buChar char="•"/>
+                </a:pPr>
+                <a:r>
+                  <a:rPr lang="en-US" altLang="zh-CN" sz="1600" dirty="0">
+                    <a:latin typeface="Bahnschrift" panose="020B0502040204020203" pitchFamily="34" charset="0"/>
+                    <a:cs typeface="Times New Roman" panose="02020603050405020304" pitchFamily="18" charset="0"/>
+                  </a:rPr>
+                  <a:t>Analyze PMT scans to identify low trigger rates</a:t>
+                </a:r>
+              </a:p>
+            </p:txBody>
+          </p:sp>
+        </mc:Choice>
+        <mc:Fallback>
+          <p:sp>
+            <p:nvSpPr>
+              <p:cNvPr id="8" name="TextBox 7">
+                <a:extLst>
+                  <a:ext uri="{FF2B5EF4-FFF2-40B4-BE49-F238E27FC236}">
+                    <a16:creationId xmlns:a16="http://schemas.microsoft.com/office/drawing/2014/main" id="{4F3FE831-67DE-FC6D-6192-6A7EAE320CB9}"/>
+                  </a:ext>
+                </a:extLst>
+              </p:cNvPr>
+              <p:cNvSpPr txBox="1">
+                <a:spLocks noRot="1" noChangeAspect="1" noMove="1" noResize="1" noEditPoints="1" noAdjustHandles="1" noChangeArrowheads="1" noChangeShapeType="1" noTextEdit="1"/>
+              </p:cNvSpPr>
+              <p:nvPr/>
+            </p:nvSpPr>
+            <p:spPr>
+              <a:xfrm>
+                <a:off x="663913" y="2005514"/>
+                <a:ext cx="4708712" cy="3785652"/>
+              </a:xfrm>
+              <a:prstGeom prst="rect">
+                <a:avLst/>
+              </a:prstGeom>
+              <a:blipFill>
+                <a:blip r:embed="rId3"/>
+                <a:stretch>
+                  <a:fillRect l="-1166" t="-966" b="-1127"/>
+                </a:stretch>
+              </a:blipFill>
+            </p:spPr>
+            <p:txBody>
+              <a:bodyPr/>
+              <a:lstStyle/>
+              <a:p>
+                <a:r>
+                  <a:rPr lang="en-US">
+                    <a:noFill/>
+                  </a:rPr>
+                  <a:t> </a:t>
+                </a:r>
+              </a:p>
+            </p:txBody>
+          </p:sp>
+        </mc:Fallback>
+      </mc:AlternateContent>
+      <p:sp>
+        <p:nvSpPr>
+          <p:cNvPr id="7" name="TextBox 6">
+            <a:extLst>
+              <a:ext uri="{FF2B5EF4-FFF2-40B4-BE49-F238E27FC236}">
+                <a16:creationId xmlns:a16="http://schemas.microsoft.com/office/drawing/2014/main" id="{12B492B3-84E4-7118-FA73-C55DDDEC110B}"/>
+              </a:ext>
+            </a:extLst>
+          </p:cNvPr>
+          <p:cNvSpPr txBox="1"/>
+          <p:nvPr/>
+        </p:nvSpPr>
+        <p:spPr>
+          <a:xfrm>
+            <a:off x="8093413" y="5369668"/>
+            <a:ext cx="3346315" cy="369332"/>
+          </a:xfrm>
+          <a:prstGeom prst="rect">
+            <a:avLst/>
+          </a:prstGeom>
+          <a:noFill/>
+        </p:spPr>
+        <p:txBody>
+          <a:bodyPr wrap="square" rtlCol="0">
+            <a:spAutoFit/>
+          </a:bodyPr>
+          <a:lstStyle/>
+          <a:p>
+            <a:r>
+              <a:rPr lang="en-US" dirty="0">
+                <a:latin typeface="Bahnschrift" panose="020B0502040204020203" pitchFamily="34" charset="0"/>
+              </a:rPr>
+              <a:t>Schematic of L1 calo tower</a:t>
+            </a:r>
           </a:p>
         </p:txBody>
       </p:sp>
     </p:spTree>
     <p:extLst>
       <p:ext uri="{BB962C8B-B14F-4D97-AF65-F5344CB8AC3E}">
-        <p14:creationId xmlns:p14="http://schemas.microsoft.com/office/powerpoint/2010/main" val="3812416051"/>
+        <p14:creationId xmlns:p14="http://schemas.microsoft.com/office/powerpoint/2010/main" val="410615770"/>
       </p:ext>
     </p:extLst>
   </p:cSld>
@@ -6391,7 +7004,7 @@
         </p:nvSpPr>
         <p:spPr>
           <a:xfrm>
-            <a:off x="1683171" y="2757942"/>
+            <a:off x="298884" y="1960274"/>
             <a:ext cx="8825659" cy="3261857"/>
           </a:xfrm>
         </p:spPr>
@@ -6400,15 +7013,6 @@
             <a:normAutofit/>
           </a:bodyPr>
           <a:lstStyle/>
-          <a:p>
-            <a:r>
-              <a:rPr lang="en-US" altLang="zh-CN" sz="2000" dirty="0">
-                <a:latin typeface="Bahnschrift" panose="020B0502040204020203" pitchFamily="34" charset="0"/>
-                <a:cs typeface="Times New Roman" panose="02020603050405020304" pitchFamily="18" charset="0"/>
-              </a:rPr>
-              <a:t>Meeting with Irakli Minashvili</a:t>
-            </a:r>
-          </a:p>
           <a:p>
             <a:endParaRPr lang="en-US" altLang="zh-CN" sz="2000" dirty="0">
               <a:latin typeface="Bahnschrift" panose="020B0502040204020203" pitchFamily="34" charset="0"/>
@@ -6416,24 +7020,6 @@
             </a:endParaRPr>
           </a:p>
           <a:p>
-            <a:r>
-              <a:rPr lang="en-US" altLang="zh-CN" sz="2000" dirty="0">
-                <a:latin typeface="Bahnschrift" panose="020B0502040204020203" pitchFamily="34" charset="0"/>
-                <a:cs typeface="Times New Roman" panose="02020603050405020304" pitchFamily="18" charset="0"/>
-              </a:rPr>
-              <a:t>Done:</a:t>
-            </a:r>
-          </a:p>
-          <a:p>
-            <a:r>
-              <a:rPr lang="en-US" altLang="zh-CN" sz="2000" dirty="0">
-                <a:latin typeface="Bahnschrift" panose="020B0502040204020203" pitchFamily="34" charset="0"/>
-                <a:cs typeface="Times New Roman" panose="02020603050405020304" pitchFamily="18" charset="0"/>
-              </a:rPr>
-              <a:t>Checked the legacy Tile system in Test Beam.</a:t>
-            </a:r>
-          </a:p>
-          <a:p>
             <a:endParaRPr lang="en-US" altLang="zh-CN" sz="2000" dirty="0">
               <a:latin typeface="Bahnschrift" panose="020B0502040204020203" pitchFamily="34" charset="0"/>
               <a:cs typeface="Times New Roman" panose="02020603050405020304" pitchFamily="18" charset="0"/>
@@ -6445,6 +7031,30 @@
                 <a:latin typeface="Bahnschrift" panose="020B0502040204020203" pitchFamily="34" charset="0"/>
                 <a:cs typeface="Times New Roman" panose="02020603050405020304" pitchFamily="18" charset="0"/>
               </a:rPr>
+              <a:t>Done:</a:t>
+            </a:r>
+          </a:p>
+          <a:p>
+            <a:r>
+              <a:rPr lang="en-US" altLang="zh-CN" sz="2000" dirty="0">
+                <a:latin typeface="Bahnschrift" panose="020B0502040204020203" pitchFamily="34" charset="0"/>
+                <a:cs typeface="Times New Roman" panose="02020603050405020304" pitchFamily="18" charset="0"/>
+              </a:rPr>
+              <a:t>Given overview of system and a tour in control room</a:t>
+            </a:r>
+          </a:p>
+          <a:p>
+            <a:endParaRPr lang="en-US" altLang="zh-CN" sz="2000" dirty="0">
+              <a:latin typeface="Bahnschrift" panose="020B0502040204020203" pitchFamily="34" charset="0"/>
+              <a:cs typeface="Times New Roman" panose="02020603050405020304" pitchFamily="18" charset="0"/>
+            </a:endParaRPr>
+          </a:p>
+          <a:p>
+            <a:r>
+              <a:rPr lang="en-US" altLang="zh-CN" sz="2000" dirty="0">
+                <a:latin typeface="Bahnschrift" panose="020B0502040204020203" pitchFamily="34" charset="0"/>
+                <a:cs typeface="Times New Roman" panose="02020603050405020304" pitchFamily="18" charset="0"/>
+              </a:rPr>
               <a:t>To do:</a:t>
             </a:r>
           </a:p>
@@ -6454,16 +7064,7 @@
                 <a:latin typeface="Bahnschrift" panose="020B0502040204020203" pitchFamily="34" charset="0"/>
                 <a:cs typeface="Times New Roman" panose="02020603050405020304" pitchFamily="18" charset="0"/>
               </a:rPr>
-              <a:t>Shift training. </a:t>
-            </a:r>
-          </a:p>
-          <a:p>
-            <a:r>
-              <a:rPr lang="en-US" altLang="zh-CN" sz="2000" dirty="0">
-                <a:latin typeface="Bahnschrift" panose="020B0502040204020203" pitchFamily="34" charset="0"/>
-                <a:cs typeface="Times New Roman" panose="02020603050405020304" pitchFamily="18" charset="0"/>
-              </a:rPr>
-              <a:t>None, until further notice. (Irakli is taking his vacation)</a:t>
+              <a:t>Codes review? </a:t>
             </a:r>
           </a:p>
           <a:p>
@@ -6525,20 +7126,152 @@
                 </a:solidFill>
                 <a:latin typeface="Bahnschrift" panose="020B0502040204020203" pitchFamily="34" charset="0"/>
               </a:rPr>
-              <a:t>5. Test Beam</a:t>
+              <a:t>3. L1 Calo Trigger System</a:t>
             </a:r>
             <a:endParaRPr lang="en-US" dirty="0"/>
           </a:p>
           <a:p>
             <a:pPr algn="ctr"/>
             <a:endParaRPr lang="en-US" dirty="0"/>
+          </a:p>
+        </p:txBody>
+      </p:sp>
+      <p:pic>
+        <p:nvPicPr>
+          <p:cNvPr id="6" name="Picture 5">
+            <a:extLst>
+              <a:ext uri="{FF2B5EF4-FFF2-40B4-BE49-F238E27FC236}">
+                <a16:creationId xmlns:a16="http://schemas.microsoft.com/office/drawing/2014/main" id="{FDAD15F8-2EA3-B9FA-D3D0-4C21E2E3F73F}"/>
+              </a:ext>
+            </a:extLst>
+          </p:cNvPr>
+          <p:cNvPicPr>
+            <a:picLocks noChangeAspect="1"/>
+          </p:cNvPicPr>
+          <p:nvPr/>
+        </p:nvPicPr>
+        <p:blipFill rotWithShape="1">
+          <a:blip r:embed="rId2"/>
+          <a:srcRect l="30240" t="16596" r="21728" b="16737"/>
+          <a:stretch/>
+        </p:blipFill>
+        <p:spPr>
+          <a:xfrm>
+            <a:off x="6196517" y="1661993"/>
+            <a:ext cx="5856051" cy="4572000"/>
+          </a:xfrm>
+          <a:prstGeom prst="rect">
+            <a:avLst/>
+          </a:prstGeom>
+        </p:spPr>
+      </p:pic>
+      <p:sp>
+        <p:nvSpPr>
+          <p:cNvPr id="7" name="TextBox 6">
+            <a:extLst>
+              <a:ext uri="{FF2B5EF4-FFF2-40B4-BE49-F238E27FC236}">
+                <a16:creationId xmlns:a16="http://schemas.microsoft.com/office/drawing/2014/main" id="{566B34EF-1418-6AD5-F971-2FA5B6F5C48E}"/>
+              </a:ext>
+            </a:extLst>
+          </p:cNvPr>
+          <p:cNvSpPr txBox="1"/>
+          <p:nvPr/>
+        </p:nvSpPr>
+        <p:spPr>
+          <a:xfrm>
+            <a:off x="6196516" y="6233993"/>
+            <a:ext cx="5107023" cy="646331"/>
+          </a:xfrm>
+          <a:prstGeom prst="rect">
+            <a:avLst/>
+          </a:prstGeom>
+          <a:noFill/>
+        </p:spPr>
+        <p:txBody>
+          <a:bodyPr wrap="square" rtlCol="0">
+            <a:spAutoFit/>
+          </a:bodyPr>
+          <a:lstStyle/>
+          <a:p>
+            <a:r>
+              <a:rPr lang="en-US" dirty="0">
+                <a:latin typeface="Bahnschrift" panose="020B0502040204020203" pitchFamily="34" charset="0"/>
+              </a:rPr>
+              <a:t>Current L1 Calo Mapping Tool in Online Histogram Presenter (OHP) </a:t>
+            </a:r>
+          </a:p>
+        </p:txBody>
+      </p:sp>
+      <p:pic>
+        <p:nvPicPr>
+          <p:cNvPr id="11" name="Picture 10">
+            <a:extLst>
+              <a:ext uri="{FF2B5EF4-FFF2-40B4-BE49-F238E27FC236}">
+                <a16:creationId xmlns:a16="http://schemas.microsoft.com/office/drawing/2014/main" id="{499486C9-7BDD-7810-7F2E-A491F01B6D9E}"/>
+              </a:ext>
+            </a:extLst>
+          </p:cNvPr>
+          <p:cNvPicPr>
+            <a:picLocks noChangeAspect="1"/>
+          </p:cNvPicPr>
+          <p:nvPr/>
+        </p:nvPicPr>
+        <p:blipFill rotWithShape="1">
+          <a:blip r:embed="rId3"/>
+          <a:srcRect l="13963" t="37163" r="60903" b="34042"/>
+          <a:stretch/>
+        </p:blipFill>
+        <p:spPr>
+          <a:xfrm>
+            <a:off x="982493" y="3130868"/>
+            <a:ext cx="4815192" cy="3103125"/>
+          </a:xfrm>
+          <a:prstGeom prst="rect">
+            <a:avLst/>
+          </a:prstGeom>
+        </p:spPr>
+      </p:pic>
+      <p:sp>
+        <p:nvSpPr>
+          <p:cNvPr id="12" name="TextBox 11">
+            <a:extLst>
+              <a:ext uri="{FF2B5EF4-FFF2-40B4-BE49-F238E27FC236}">
+                <a16:creationId xmlns:a16="http://schemas.microsoft.com/office/drawing/2014/main" id="{7263D633-5C81-9542-DFF0-9976E1B81F09}"/>
+              </a:ext>
+            </a:extLst>
+          </p:cNvPr>
+          <p:cNvSpPr txBox="1"/>
+          <p:nvPr/>
+        </p:nvSpPr>
+        <p:spPr>
+          <a:xfrm>
+            <a:off x="1287294" y="6209108"/>
+            <a:ext cx="5107023" cy="646331"/>
+          </a:xfrm>
+          <a:prstGeom prst="rect">
+            <a:avLst/>
+          </a:prstGeom>
+          <a:noFill/>
+        </p:spPr>
+        <p:txBody>
+          <a:bodyPr wrap="square" rtlCol="0">
+            <a:spAutoFit/>
+          </a:bodyPr>
+          <a:lstStyle/>
+          <a:p>
+            <a:r>
+              <a:rPr lang="en-US" dirty="0">
+                <a:latin typeface="Bahnschrift" panose="020B0502040204020203" pitchFamily="34" charset="0"/>
+              </a:rPr>
+              <a:t>Current L1 Calo Mapping Tool Data Quality Monitoring Display (DQMD)</a:t>
+            </a:r>
           </a:p>
         </p:txBody>
       </p:sp>
     </p:spTree>
     <p:extLst>
       <p:ext uri="{BB962C8B-B14F-4D97-AF65-F5344CB8AC3E}">
-        <p14:creationId xmlns:p14="http://schemas.microsoft.com/office/powerpoint/2010/main" val="2905575947"/>
+        <p14:creationId xmlns:p14="http://schemas.microsoft.com/office/powerpoint/2010/main" val="3944741202"/>
       </p:ext>
     </p:extLst>
   </p:cSld>
@@ -6592,60 +7325,55 @@
                 <a:latin typeface="Bahnschrift" panose="020B0502040204020203" pitchFamily="34" charset="0"/>
                 <a:cs typeface="Times New Roman" panose="02020603050405020304" pitchFamily="18" charset="0"/>
               </a:rPr>
-              <a:t>Peter’s first shifts were August 2 – August 8</a:t>
-            </a:r>
-          </a:p>
-          <a:p>
-            <a:pPr lvl="1"/>
-            <a:r>
-              <a:rPr lang="en-US" altLang="zh-CN" sz="1600" dirty="0">
+              <a:t>Knowledge Transferred from Dawit</a:t>
+            </a:r>
+          </a:p>
+          <a:p>
+            <a:endParaRPr lang="en-US" altLang="zh-CN" sz="2000" dirty="0">
+              <a:latin typeface="Bahnschrift" panose="020B0502040204020203" pitchFamily="34" charset="0"/>
+              <a:cs typeface="Times New Roman" panose="02020603050405020304" pitchFamily="18" charset="0"/>
+            </a:endParaRPr>
+          </a:p>
+          <a:p>
+            <a:r>
+              <a:rPr lang="en-US" altLang="zh-CN" sz="2000" dirty="0">
                 <a:latin typeface="Bahnschrift" panose="020B0502040204020203" pitchFamily="34" charset="0"/>
                 <a:cs typeface="Times New Roman" panose="02020603050405020304" pitchFamily="18" charset="0"/>
               </a:rPr>
-              <a:t>Monitoring data quality for Tile modules</a:t>
-            </a:r>
-          </a:p>
-          <a:p>
-            <a:pPr lvl="1"/>
-            <a:r>
-              <a:rPr lang="en-US" altLang="zh-CN" sz="1600" dirty="0">
+              <a:t>Done:</a:t>
+            </a:r>
+          </a:p>
+          <a:p>
+            <a:r>
+              <a:rPr lang="en-US" altLang="zh-CN" sz="2000" dirty="0">
                 <a:latin typeface="Bahnschrift" panose="020B0502040204020203" pitchFamily="34" charset="0"/>
                 <a:cs typeface="Times New Roman" panose="02020603050405020304" pitchFamily="18" charset="0"/>
               </a:rPr>
-              <a:t>Reporting on </a:t>
-            </a:r>
-            <a:r>
-              <a:rPr lang="en-US" altLang="zh-CN" sz="1600" dirty="0" err="1">
+              <a:t>Recreated plots</a:t>
+            </a:r>
+          </a:p>
+          <a:p>
+            <a:endParaRPr lang="en-US" altLang="zh-CN" sz="2000" dirty="0">
+              <a:latin typeface="Bahnschrift" panose="020B0502040204020203" pitchFamily="34" charset="0"/>
+              <a:cs typeface="Times New Roman" panose="02020603050405020304" pitchFamily="18" charset="0"/>
+            </a:endParaRPr>
+          </a:p>
+          <a:p>
+            <a:r>
+              <a:rPr lang="en-US" altLang="zh-CN" sz="2000" dirty="0">
                 <a:latin typeface="Bahnschrift" panose="020B0502040204020203" pitchFamily="34" charset="0"/>
                 <a:cs typeface="Times New Roman" panose="02020603050405020304" pitchFamily="18" charset="0"/>
               </a:rPr>
-              <a:t>LAr</a:t>
-            </a:r>
-            <a:r>
-              <a:rPr lang="en-US" altLang="zh-CN" sz="1600" dirty="0">
+              <a:t>To do:</a:t>
+            </a:r>
+          </a:p>
+          <a:p>
+            <a:r>
+              <a:rPr lang="en-US" altLang="zh-CN" sz="2000" dirty="0">
                 <a:latin typeface="Bahnschrift" panose="020B0502040204020203" pitchFamily="34" charset="0"/>
                 <a:cs typeface="Times New Roman" panose="02020603050405020304" pitchFamily="18" charset="0"/>
               </a:rPr>
-              <a:t> status and major problems </a:t>
-            </a:r>
-          </a:p>
-          <a:p>
-            <a:pPr lvl="1"/>
-            <a:r>
-              <a:rPr lang="en-US" altLang="zh-CN" sz="1600" dirty="0">
-                <a:latin typeface="Bahnschrift" panose="020B0502040204020203" pitchFamily="34" charset="0"/>
-                <a:cs typeface="Times New Roman" panose="02020603050405020304" pitchFamily="18" charset="0"/>
-              </a:rPr>
-              <a:t>More shifts in late August and September</a:t>
-            </a:r>
-          </a:p>
-          <a:p>
-            <a:r>
-              <a:rPr lang="en-US" altLang="zh-CN" sz="2000" dirty="0">
-                <a:latin typeface="Bahnschrift" panose="020B0502040204020203" pitchFamily="34" charset="0"/>
-                <a:cs typeface="Times New Roman" panose="02020603050405020304" pitchFamily="18" charset="0"/>
-              </a:rPr>
-              <a:t>Jacky’s shift training is in late August, will take shifts next semester</a:t>
+              <a:t>None, until further notice.</a:t>
             </a:r>
           </a:p>
           <a:p>
@@ -6707,7 +7435,7 @@
                 </a:solidFill>
                 <a:latin typeface="Bahnschrift" panose="020B0502040204020203" pitchFamily="34" charset="0"/>
               </a:rPr>
-              <a:t>6. ATLAS Control Room Shifts</a:t>
+              <a:t>4. Fast Calo Simulation (FCS)</a:t>
             </a:r>
             <a:endParaRPr lang="en-US" dirty="0"/>
           </a:p>
@@ -6720,7 +7448,7 @@
     </p:spTree>
     <p:extLst>
       <p:ext uri="{BB962C8B-B14F-4D97-AF65-F5344CB8AC3E}">
-        <p14:creationId xmlns:p14="http://schemas.microsoft.com/office/powerpoint/2010/main" val="2788648890"/>
+        <p14:creationId xmlns:p14="http://schemas.microsoft.com/office/powerpoint/2010/main" val="3812416051"/>
       </p:ext>
     </p:extLst>
   </p:cSld>

</xml_diff>

<commit_message>
Changes to picture slides, maintenance
</commit_message>
<xml_diff>
--- a/Chicago Reports/08-15-2022_Jacky&Peter.pptx
+++ b/Chicago Reports/08-15-2022_Jacky&Peter.pptx
@@ -4457,12 +4457,37 @@
             </a:r>
           </a:p>
           <a:p>
-            <a:r>
-              <a:rPr lang="en-US" altLang="zh-CN" sz="2000" dirty="0">
+            <a:pPr lvl="1"/>
+            <a:r>
+              <a:rPr lang="en-US" altLang="zh-CN" sz="1600" dirty="0">
                 <a:latin typeface="Bahnschrift" panose="020B0502040204020203" pitchFamily="34" charset="0"/>
                 <a:cs typeface="Times New Roman" panose="02020603050405020304" pitchFamily="18" charset="0"/>
               </a:rPr>
               <a:t>Checked the legacy Tile system in Test Beam.</a:t>
+            </a:r>
+          </a:p>
+          <a:p>
+            <a:pPr lvl="1"/>
+            <a:r>
+              <a:rPr lang="en-US" altLang="zh-CN" sz="1600" dirty="0">
+                <a:latin typeface="Bahnschrift" panose="020B0502040204020203" pitchFamily="34" charset="0"/>
+                <a:cs typeface="Times New Roman" panose="02020603050405020304" pitchFamily="18" charset="0"/>
+              </a:rPr>
+              <a:t>Fixed </a:t>
+            </a:r>
+            <a:r>
+              <a:rPr lang="en-US" altLang="zh-CN" sz="1600" dirty="0" err="1">
+                <a:latin typeface="Bahnschrift" panose="020B0502040204020203" pitchFamily="34" charset="0"/>
+                <a:cs typeface="Times New Roman" panose="02020603050405020304" pitchFamily="18" charset="0"/>
+              </a:rPr>
+              <a:t>Mobidick</a:t>
+            </a:r>
+            <a:r>
+              <a:rPr lang="en-US" altLang="zh-CN" sz="1600" dirty="0">
+                <a:latin typeface="Bahnschrift" panose="020B0502040204020203" pitchFamily="34" charset="0"/>
+                <a:cs typeface="Times New Roman" panose="02020603050405020304" pitchFamily="18" charset="0"/>
+              </a:rPr>
+              <a:t> HV problem</a:t>
             </a:r>
           </a:p>
           <a:p>
@@ -4481,21 +4506,23 @@
             </a:r>
           </a:p>
           <a:p>
-            <a:r>
-              <a:rPr lang="en-US" altLang="zh-CN" sz="2000" dirty="0">
+            <a:pPr lvl="1"/>
+            <a:r>
+              <a:rPr lang="en-US" altLang="zh-CN" sz="1600" dirty="0">
                 <a:latin typeface="Bahnschrift" panose="020B0502040204020203" pitchFamily="34" charset="0"/>
                 <a:cs typeface="Times New Roman" panose="02020603050405020304" pitchFamily="18" charset="0"/>
               </a:rPr>
-              <a:t>Shift training. </a:t>
-            </a:r>
-          </a:p>
-          <a:p>
-            <a:r>
-              <a:rPr lang="en-US" altLang="zh-CN" sz="2000" dirty="0">
+              <a:t>Shift training before new test beam in November</a:t>
+            </a:r>
+          </a:p>
+          <a:p>
+            <a:pPr lvl="1"/>
+            <a:r>
+              <a:rPr lang="en-US" altLang="zh-CN" sz="1600" dirty="0">
                 <a:latin typeface="Bahnschrift" panose="020B0502040204020203" pitchFamily="34" charset="0"/>
                 <a:cs typeface="Times New Roman" panose="02020603050405020304" pitchFamily="18" charset="0"/>
               </a:rPr>
-              <a:t>None, until further notice. (Irakli is taking his vacation)</a:t>
+              <a:t>None maintenance until further notice (Irakli is taking his vacation)</a:t>
             </a:r>
           </a:p>
           <a:p>
@@ -5066,8 +5093,8 @@
         </p:nvSpPr>
         <p:spPr>
           <a:xfrm>
-            <a:off x="1177333" y="3292963"/>
-            <a:ext cx="3170931" cy="695377"/>
+            <a:off x="2509736" y="2405652"/>
+            <a:ext cx="1762599" cy="1310314"/>
           </a:xfrm>
         </p:spPr>
         <p:txBody>
@@ -5080,7 +5107,7 @@
               <a:buNone/>
             </a:pPr>
             <a:r>
-              <a:rPr lang="en-US" altLang="zh-CN" sz="2000" dirty="0">
+              <a:rPr lang="en-US" altLang="zh-CN" sz="1800" dirty="0">
                 <a:latin typeface="Bahnschrift" panose="020B0502040204020203" pitchFamily="34" charset="0"/>
                 <a:cs typeface="Times New Roman" panose="02020603050405020304" pitchFamily="18" charset="0"/>
               </a:rPr>
@@ -5150,6 +5177,182 @@
           </a:p>
         </p:txBody>
       </p:sp>
+      <p:sp>
+        <p:nvSpPr>
+          <p:cNvPr id="7" name="TextBox 6">
+            <a:extLst>
+              <a:ext uri="{FF2B5EF4-FFF2-40B4-BE49-F238E27FC236}">
+                <a16:creationId xmlns:a16="http://schemas.microsoft.com/office/drawing/2014/main" id="{30478EFF-F4E1-57EC-76C9-1EEAF69E0CF1}"/>
+              </a:ext>
+            </a:extLst>
+          </p:cNvPr>
+          <p:cNvSpPr txBox="1"/>
+          <p:nvPr/>
+        </p:nvSpPr>
+        <p:spPr>
+          <a:xfrm>
+            <a:off x="9165886" y="3312426"/>
+            <a:ext cx="3528709" cy="646331"/>
+          </a:xfrm>
+          <a:prstGeom prst="rect">
+            <a:avLst/>
+          </a:prstGeom>
+          <a:noFill/>
+        </p:spPr>
+        <p:txBody>
+          <a:bodyPr wrap="square">
+            <a:spAutoFit/>
+          </a:bodyPr>
+          <a:lstStyle/>
+          <a:p>
+            <a:pPr marL="0" indent="0">
+              <a:buNone/>
+            </a:pPr>
+            <a:r>
+              <a:rPr lang="en-US" altLang="zh-CN" dirty="0">
+                <a:latin typeface="Bahnschrift" panose="020B0502040204020203" pitchFamily="34" charset="0"/>
+                <a:cs typeface="Times New Roman" panose="02020603050405020304" pitchFamily="18" charset="0"/>
+              </a:rPr>
+              <a:t>Peter playing the carillon at Cathedrale St.-Pierre</a:t>
+            </a:r>
+            <a:endParaRPr lang="en-US" altLang="zh-CN" sz="1800" dirty="0">
+              <a:latin typeface="Bahnschrift" panose="020B0502040204020203" pitchFamily="34" charset="0"/>
+              <a:cs typeface="Times New Roman" panose="02020603050405020304" pitchFamily="18" charset="0"/>
+            </a:endParaRPr>
+          </a:p>
+        </p:txBody>
+      </p:sp>
+      <p:sp>
+        <p:nvSpPr>
+          <p:cNvPr id="8" name="TextBox 7">
+            <a:extLst>
+              <a:ext uri="{FF2B5EF4-FFF2-40B4-BE49-F238E27FC236}">
+                <a16:creationId xmlns:a16="http://schemas.microsoft.com/office/drawing/2014/main" id="{1CDB35C3-A30C-87C6-55D2-7D9EBDEA87B7}"/>
+              </a:ext>
+            </a:extLst>
+          </p:cNvPr>
+          <p:cNvSpPr txBox="1"/>
+          <p:nvPr/>
+        </p:nvSpPr>
+        <p:spPr>
+          <a:xfrm>
+            <a:off x="147809" y="6441098"/>
+            <a:ext cx="3528709" cy="369332"/>
+          </a:xfrm>
+          <a:prstGeom prst="rect">
+            <a:avLst/>
+          </a:prstGeom>
+          <a:noFill/>
+        </p:spPr>
+        <p:txBody>
+          <a:bodyPr wrap="square">
+            <a:spAutoFit/>
+          </a:bodyPr>
+          <a:lstStyle/>
+          <a:p>
+            <a:pPr marL="0" indent="0">
+              <a:buNone/>
+            </a:pPr>
+            <a:r>
+              <a:rPr lang="en-US" altLang="zh-CN" dirty="0">
+                <a:latin typeface="Bahnschrift" panose="020B0502040204020203" pitchFamily="34" charset="0"/>
+                <a:cs typeface="Times New Roman" panose="02020603050405020304" pitchFamily="18" charset="0"/>
+              </a:rPr>
+              <a:t>At Bains de </a:t>
+            </a:r>
+            <a:r>
+              <a:rPr lang="en-US" altLang="zh-CN" dirty="0" err="1">
+                <a:latin typeface="Bahnschrift" panose="020B0502040204020203" pitchFamily="34" charset="0"/>
+                <a:cs typeface="Times New Roman" panose="02020603050405020304" pitchFamily="18" charset="0"/>
+              </a:rPr>
+              <a:t>Pâquis</a:t>
+            </a:r>
+            <a:r>
+              <a:rPr lang="en-US" altLang="zh-CN" dirty="0">
+                <a:latin typeface="Bahnschrift" panose="020B0502040204020203" pitchFamily="34" charset="0"/>
+                <a:cs typeface="Times New Roman" panose="02020603050405020304" pitchFamily="18" charset="0"/>
+              </a:rPr>
+              <a:t> </a:t>
+            </a:r>
+            <a:endParaRPr lang="en-US" altLang="zh-CN" sz="1800" dirty="0">
+              <a:latin typeface="Bahnschrift" panose="020B0502040204020203" pitchFamily="34" charset="0"/>
+              <a:cs typeface="Times New Roman" panose="02020603050405020304" pitchFamily="18" charset="0"/>
+            </a:endParaRPr>
+          </a:p>
+        </p:txBody>
+      </p:sp>
+      <p:pic>
+        <p:nvPicPr>
+          <p:cNvPr id="6" name="Picture 5" descr="A person playing a piano&#10;&#10;Description automatically generated with medium confidence">
+            <a:extLst>
+              <a:ext uri="{FF2B5EF4-FFF2-40B4-BE49-F238E27FC236}">
+                <a16:creationId xmlns:a16="http://schemas.microsoft.com/office/drawing/2014/main" id="{B3005BEF-0AB1-A30F-36D8-C64530CB0C94}"/>
+              </a:ext>
+            </a:extLst>
+          </p:cNvPr>
+          <p:cNvPicPr>
+            <a:picLocks noChangeAspect="1"/>
+          </p:cNvPicPr>
+          <p:nvPr/>
+        </p:nvPicPr>
+        <p:blipFill>
+          <a:blip r:embed="rId3" cstate="print">
+            <a:extLst>
+              <a:ext uri="{28A0092B-C50C-407E-A947-70E740481C1C}">
+                <a14:useLocalDpi xmlns:a14="http://schemas.microsoft.com/office/drawing/2010/main" val="0"/>
+              </a:ext>
+            </a:extLst>
+          </a:blip>
+          <a:stretch>
+            <a:fillRect/>
+          </a:stretch>
+        </p:blipFill>
+        <p:spPr>
+          <a:xfrm>
+            <a:off x="9808744" y="4029355"/>
+            <a:ext cx="2059813" cy="2574766"/>
+          </a:xfrm>
+          <a:prstGeom prst="rect">
+            <a:avLst/>
+          </a:prstGeom>
+        </p:spPr>
+      </p:pic>
+      <p:pic>
+        <p:nvPicPr>
+          <p:cNvPr id="12" name="Picture 11" descr="A picture containing person, outdoor&#10;&#10;Description automatically generated">
+            <a:extLst>
+              <a:ext uri="{FF2B5EF4-FFF2-40B4-BE49-F238E27FC236}">
+                <a16:creationId xmlns:a16="http://schemas.microsoft.com/office/drawing/2014/main" id="{E3DA55FC-0E9E-A055-6945-4758A64D2EA8}"/>
+              </a:ext>
+            </a:extLst>
+          </p:cNvPr>
+          <p:cNvPicPr>
+            <a:picLocks noChangeAspect="1"/>
+          </p:cNvPicPr>
+          <p:nvPr/>
+        </p:nvPicPr>
+        <p:blipFill>
+          <a:blip r:embed="rId4" cstate="print">
+            <a:extLst>
+              <a:ext uri="{28A0092B-C50C-407E-A947-70E740481C1C}">
+                <a14:useLocalDpi xmlns:a14="http://schemas.microsoft.com/office/drawing/2010/main" val="0"/>
+              </a:ext>
+            </a:extLst>
+          </a:blip>
+          <a:stretch>
+            <a:fillRect/>
+          </a:stretch>
+        </p:blipFill>
+        <p:spPr>
+          <a:xfrm rot="10800000">
+            <a:off x="147809" y="3844689"/>
+            <a:ext cx="3433021" cy="2574766"/>
+          </a:xfrm>
+          <a:prstGeom prst="rect">
+            <a:avLst/>
+          </a:prstGeom>
+        </p:spPr>
+      </p:pic>
     </p:spTree>
     <p:extLst>
       <p:ext uri="{BB962C8B-B14F-4D97-AF65-F5344CB8AC3E}">
@@ -5207,61 +5410,19 @@
                 <a:latin typeface="Bahnschrift" panose="020B0502040204020203" pitchFamily="34" charset="0"/>
                 <a:cs typeface="Times New Roman" panose="02020603050405020304" pitchFamily="18" charset="0"/>
               </a:rPr>
-              <a:t>Peter’s first shifts were August 2 – August 8</a:t>
-            </a:r>
-          </a:p>
-          <a:p>
-            <a:pPr lvl="1"/>
-            <a:r>
-              <a:rPr lang="en-US" altLang="zh-CN" sz="1600" dirty="0">
+              <a:t>Add questions here if </a:t>
+            </a:r>
+            <a:r>
+              <a:rPr lang="en-US" altLang="zh-CN" sz="2000">
                 <a:latin typeface="Bahnschrift" panose="020B0502040204020203" pitchFamily="34" charset="0"/>
                 <a:cs typeface="Times New Roman" panose="02020603050405020304" pitchFamily="18" charset="0"/>
               </a:rPr>
-              <a:t>Monitoring data quality for Tile modules</a:t>
-            </a:r>
-          </a:p>
-          <a:p>
-            <a:pPr lvl="1"/>
-            <a:r>
-              <a:rPr lang="en-US" altLang="zh-CN" sz="1600" dirty="0">
-                <a:latin typeface="Bahnschrift" panose="020B0502040204020203" pitchFamily="34" charset="0"/>
-                <a:cs typeface="Times New Roman" panose="02020603050405020304" pitchFamily="18" charset="0"/>
-              </a:rPr>
-              <a:t>Reporting on </a:t>
-            </a:r>
-            <a:r>
-              <a:rPr lang="en-US" altLang="zh-CN" sz="1600" dirty="0" err="1">
-                <a:latin typeface="Bahnschrift" panose="020B0502040204020203" pitchFamily="34" charset="0"/>
-                <a:cs typeface="Times New Roman" panose="02020603050405020304" pitchFamily="18" charset="0"/>
-              </a:rPr>
-              <a:t>LAr</a:t>
-            </a:r>
-            <a:r>
-              <a:rPr lang="en-US" altLang="zh-CN" sz="1600" dirty="0">
-                <a:latin typeface="Bahnschrift" panose="020B0502040204020203" pitchFamily="34" charset="0"/>
-                <a:cs typeface="Times New Roman" panose="02020603050405020304" pitchFamily="18" charset="0"/>
-              </a:rPr>
-              <a:t> status and major problems </a:t>
-            </a:r>
-          </a:p>
-          <a:p>
-            <a:pPr lvl="1"/>
-            <a:r>
-              <a:rPr lang="en-US" altLang="zh-CN" sz="1600" dirty="0">
-                <a:latin typeface="Bahnschrift" panose="020B0502040204020203" pitchFamily="34" charset="0"/>
-                <a:cs typeface="Times New Roman" panose="02020603050405020304" pitchFamily="18" charset="0"/>
-              </a:rPr>
-              <a:t>More shifts in late August and September</a:t>
-            </a:r>
-          </a:p>
-          <a:p>
-            <a:r>
-              <a:rPr lang="en-US" altLang="zh-CN" sz="2000" dirty="0">
-                <a:latin typeface="Bahnschrift" panose="020B0502040204020203" pitchFamily="34" charset="0"/>
-                <a:cs typeface="Times New Roman" panose="02020603050405020304" pitchFamily="18" charset="0"/>
-              </a:rPr>
-              <a:t>Jacky’s shift training is in late August, will take shifts next semester</a:t>
-            </a:r>
+              <a:t>we have any</a:t>
+            </a:r>
+            <a:endParaRPr lang="en-US" altLang="zh-CN" sz="2000" dirty="0">
+              <a:latin typeface="Bahnschrift" panose="020B0502040204020203" pitchFamily="34" charset="0"/>
+              <a:cs typeface="Times New Roman" panose="02020603050405020304" pitchFamily="18" charset="0"/>
+            </a:endParaRPr>
           </a:p>
           <a:p>
             <a:endParaRPr lang="en-US" altLang="zh-CN" sz="2000" dirty="0">
@@ -7004,13 +7165,13 @@
         </p:nvSpPr>
         <p:spPr>
           <a:xfrm>
-            <a:off x="298884" y="1960274"/>
-            <a:ext cx="8825659" cy="3261857"/>
+            <a:off x="237283" y="1263157"/>
+            <a:ext cx="5758201" cy="1966424"/>
           </a:xfrm>
         </p:spPr>
         <p:txBody>
           <a:bodyPr>
-            <a:normAutofit/>
+            <a:normAutofit fontScale="25000" lnSpcReduction="20000"/>
           </a:bodyPr>
           <a:lstStyle/>
           <a:p>
@@ -7020,14 +7181,14 @@
             </a:endParaRPr>
           </a:p>
           <a:p>
-            <a:endParaRPr lang="en-US" altLang="zh-CN" sz="2000" dirty="0">
+            <a:endParaRPr lang="en-US" altLang="zh-CN" sz="4500" dirty="0">
               <a:latin typeface="Bahnschrift" panose="020B0502040204020203" pitchFamily="34" charset="0"/>
               <a:cs typeface="Times New Roman" panose="02020603050405020304" pitchFamily="18" charset="0"/>
             </a:endParaRPr>
           </a:p>
           <a:p>
             <a:r>
-              <a:rPr lang="en-US" altLang="zh-CN" sz="2000" dirty="0">
+              <a:rPr lang="en-US" altLang="zh-CN" sz="7200" dirty="0">
                 <a:latin typeface="Bahnschrift" panose="020B0502040204020203" pitchFamily="34" charset="0"/>
                 <a:cs typeface="Times New Roman" panose="02020603050405020304" pitchFamily="18" charset="0"/>
               </a:rPr>
@@ -7035,40 +7196,49 @@
             </a:r>
           </a:p>
           <a:p>
-            <a:r>
-              <a:rPr lang="en-US" altLang="zh-CN" sz="2000" dirty="0">
+            <a:pPr lvl="1"/>
+            <a:r>
+              <a:rPr lang="en-US" altLang="zh-CN" sz="7200" dirty="0">
                 <a:latin typeface="Bahnschrift" panose="020B0502040204020203" pitchFamily="34" charset="0"/>
                 <a:cs typeface="Times New Roman" panose="02020603050405020304" pitchFamily="18" charset="0"/>
               </a:rPr>
-              <a:t>Given overview of system and a tour in control room</a:t>
-            </a:r>
-          </a:p>
-          <a:p>
-            <a:endParaRPr lang="en-US" altLang="zh-CN" sz="2000" dirty="0">
-              <a:latin typeface="Bahnschrift" panose="020B0502040204020203" pitchFamily="34" charset="0"/>
-              <a:cs typeface="Times New Roman" panose="02020603050405020304" pitchFamily="18" charset="0"/>
-            </a:endParaRPr>
-          </a:p>
-          <a:p>
-            <a:r>
-              <a:rPr lang="en-US" altLang="zh-CN" sz="2000" dirty="0">
+              <a:t>Reviewing code/documentation</a:t>
+            </a:r>
+          </a:p>
+          <a:p>
+            <a:pPr lvl="1"/>
+            <a:r>
+              <a:rPr lang="en-US" altLang="zh-CN" sz="7200" dirty="0">
                 <a:latin typeface="Bahnschrift" panose="020B0502040204020203" pitchFamily="34" charset="0"/>
                 <a:cs typeface="Times New Roman" panose="02020603050405020304" pitchFamily="18" charset="0"/>
               </a:rPr>
+              <a:t>Tour of ACR to see these systems in action</a:t>
+            </a:r>
+          </a:p>
+          <a:p>
+            <a:r>
+              <a:rPr lang="en-US" altLang="zh-CN" sz="7200" dirty="0">
+                <a:latin typeface="Bahnschrift" panose="020B0502040204020203" pitchFamily="34" charset="0"/>
+                <a:cs typeface="Times New Roman" panose="02020603050405020304" pitchFamily="18" charset="0"/>
+              </a:rPr>
               <a:t>To do:</a:t>
             </a:r>
           </a:p>
           <a:p>
-            <a:r>
-              <a:rPr lang="en-US" altLang="zh-CN" sz="2000" dirty="0">
+            <a:pPr lvl="1"/>
+            <a:r>
+              <a:rPr lang="en-US" altLang="zh-CN" sz="7200" dirty="0">
                 <a:latin typeface="Bahnschrift" panose="020B0502040204020203" pitchFamily="34" charset="0"/>
                 <a:cs typeface="Times New Roman" panose="02020603050405020304" pitchFamily="18" charset="0"/>
               </a:rPr>
-              <a:t>Codes review? </a:t>
-            </a:r>
-          </a:p>
-          <a:p>
-            <a:endParaRPr lang="en-US" altLang="zh-CN" sz="2000" dirty="0">
+              <a:t>Meeting with Danijela again next week to commence project </a:t>
+            </a:r>
+          </a:p>
+          <a:p>
+            <a:pPr marL="457200" lvl="1" indent="0">
+              <a:buNone/>
+            </a:pPr>
+            <a:endParaRPr lang="en-US" altLang="zh-CN" sz="1600" dirty="0">
               <a:latin typeface="Bahnschrift" panose="020B0502040204020203" pitchFamily="34" charset="0"/>
               <a:cs typeface="Times New Roman" panose="02020603050405020304" pitchFamily="18" charset="0"/>
             </a:endParaRPr>
@@ -7223,8 +7393,8 @@
         </p:blipFill>
         <p:spPr>
           <a:xfrm>
-            <a:off x="982493" y="3130868"/>
-            <a:ext cx="4815192" cy="3103125"/>
+            <a:off x="1050587" y="3262516"/>
+            <a:ext cx="4610911" cy="2971477"/>
           </a:xfrm>
           <a:prstGeom prst="rect">
             <a:avLst/>
@@ -7325,7 +7495,7 @@
                 <a:latin typeface="Bahnschrift" panose="020B0502040204020203" pitchFamily="34" charset="0"/>
                 <a:cs typeface="Times New Roman" panose="02020603050405020304" pitchFamily="18" charset="0"/>
               </a:rPr>
-              <a:t>Knowledge Transferred from Dawit</a:t>
+              <a:t>Dawit explained his code and the goal of the simulations </a:t>
             </a:r>
           </a:p>
           <a:p>

</xml_diff>